<commit_message>
update: source demo python
</commit_message>
<xml_diff>
--- a/lv2/chapter3/Chapter3.pptx
+++ b/lv2/chapter3/Chapter3.pptx
@@ -5,7 +5,7 @@
     <p:sldMasterId id="2147483663" r:id="rId1"/>
   </p:sldMasterIdLst>
   <p:notesMasterIdLst>
-    <p:notesMasterId r:id="rId14"/>
+    <p:notesMasterId r:id="rId17"/>
   </p:notesMasterIdLst>
   <p:sldIdLst>
     <p:sldId id="256" r:id="rId2"/>
@@ -19,31 +19,34 @@
     <p:sldId id="287" r:id="rId10"/>
     <p:sldId id="288" r:id="rId11"/>
     <p:sldId id="280" r:id="rId12"/>
-    <p:sldId id="281" r:id="rId13"/>
+    <p:sldId id="289" r:id="rId13"/>
+    <p:sldId id="290" r:id="rId14"/>
+    <p:sldId id="291" r:id="rId15"/>
+    <p:sldId id="281" r:id="rId16"/>
   </p:sldIdLst>
   <p:sldSz cx="12192000" cy="6858000"/>
   <p:notesSz cx="6858000" cy="9144000"/>
   <p:embeddedFontLst>
     <p:embeddedFont>
       <p:font typeface="Arial Narrow" panose="020B0606020202030204" pitchFamily="34" charset="0"/>
-      <p:regular r:id="rId15"/>
-      <p:bold r:id="rId16"/>
-      <p:italic r:id="rId17"/>
-      <p:boldItalic r:id="rId18"/>
+      <p:regular r:id="rId18"/>
+      <p:bold r:id="rId19"/>
+      <p:italic r:id="rId20"/>
+      <p:boldItalic r:id="rId21"/>
     </p:embeddedFont>
     <p:embeddedFont>
       <p:font typeface="Century Gothic" panose="020B0604020202020204" charset="0"/>
-      <p:regular r:id="rId19"/>
-      <p:bold r:id="rId20"/>
-      <p:italic r:id="rId21"/>
-      <p:boldItalic r:id="rId22"/>
+      <p:regular r:id="rId22"/>
+      <p:bold r:id="rId23"/>
+      <p:italic r:id="rId24"/>
+      <p:boldItalic r:id="rId25"/>
     </p:embeddedFont>
     <p:embeddedFont>
       <p:font typeface="Calibri" panose="020F0502020204030204" pitchFamily="34" charset="0"/>
-      <p:regular r:id="rId23"/>
-      <p:bold r:id="rId24"/>
-      <p:italic r:id="rId25"/>
-      <p:boldItalic r:id="rId26"/>
+      <p:regular r:id="rId26"/>
+      <p:bold r:id="rId27"/>
+      <p:italic r:id="rId28"/>
+      <p:boldItalic r:id="rId29"/>
     </p:embeddedFont>
   </p:embeddedFontLst>
   <p:defaultTextStyle>
@@ -275,6 +278,11 @@
       </a:defRPr>
     </a:lvl9pPr>
   </p:defaultTextStyle>
+  <p:extLst>
+    <p:ext uri="{EFAFB233-063F-42B5-8137-9DF3F51BA10A}">
+      <p15:sldGuideLst xmlns:p15="http://schemas.microsoft.com/office/powerpoint/2012/main"/>
+    </p:ext>
+  </p:extLst>
 </p:presentation>
 </file>
 
@@ -1241,6 +1249,405 @@
 </file>
 
 <file path=ppt/notesSlides/notesSlide12.xml><?xml version="1.0" encoding="utf-8"?>
+<p:notes xmlns:a="http://schemas.openxmlformats.org/drawingml/2006/main" xmlns:r="http://schemas.openxmlformats.org/officeDocument/2006/relationships" xmlns:p="http://schemas.openxmlformats.org/presentationml/2006/main" showMasterSp="0" showMasterPhAnim="0">
+  <p:cSld>
+    <p:spTree>
+      <p:nvGrpSpPr>
+        <p:cNvPr id="1" name="Shape 316"/>
+        <p:cNvGrpSpPr/>
+        <p:nvPr/>
+      </p:nvGrpSpPr>
+      <p:grpSpPr>
+        <a:xfrm>
+          <a:off x="0" y="0"/>
+          <a:ext cx="0" cy="0"/>
+          <a:chOff x="0" y="0"/>
+          <a:chExt cx="0" cy="0"/>
+        </a:xfrm>
+      </p:grpSpPr>
+      <p:sp>
+        <p:nvSpPr>
+          <p:cNvPr id="317" name="Google Shape;317;g5e30033d13_0_165:notes"/>
+          <p:cNvSpPr txBox="1">
+            <a:spLocks noGrp="1"/>
+          </p:cNvSpPr>
+          <p:nvPr>
+            <p:ph type="body" idx="1"/>
+          </p:nvPr>
+        </p:nvSpPr>
+        <p:spPr>
+          <a:xfrm>
+            <a:off x="914400" y="4343400"/>
+            <a:ext cx="5029200" cy="4114800"/>
+          </a:xfrm>
+          <a:prstGeom prst="rect">
+            <a:avLst/>
+          </a:prstGeom>
+          <a:noFill/>
+          <a:ln>
+            <a:noFill/>
+          </a:ln>
+        </p:spPr>
+        <p:txBody>
+          <a:bodyPr spcFirstLastPara="1" wrap="square" lIns="91425" tIns="45700" rIns="91425" bIns="45700" anchor="t" anchorCtr="0">
+            <a:noAutofit/>
+          </a:bodyPr>
+          <a:lstStyle/>
+          <a:p>
+            <a:pPr marL="0" marR="0" lvl="0" indent="0" algn="l" rtl="0">
+              <a:lnSpc>
+                <a:spcPct val="100000"/>
+              </a:lnSpc>
+              <a:spcBef>
+                <a:spcPts val="0"/>
+              </a:spcBef>
+              <a:spcAft>
+                <a:spcPts val="0"/>
+              </a:spcAft>
+              <a:buClr>
+                <a:srgbClr val="000000"/>
+              </a:buClr>
+              <a:buSzPts val="1400"/>
+              <a:buFont typeface="Arial"/>
+              <a:buNone/>
+            </a:pPr>
+            <a:endParaRPr sz="1200" b="0" i="0" u="none" strike="noStrike" cap="none">
+              <a:solidFill>
+                <a:srgbClr val="000000"/>
+              </a:solidFill>
+              <a:latin typeface="Calibri"/>
+              <a:ea typeface="Calibri"/>
+              <a:cs typeface="Calibri"/>
+              <a:sym typeface="Calibri"/>
+            </a:endParaRPr>
+          </a:p>
+        </p:txBody>
+      </p:sp>
+      <p:sp>
+        <p:nvSpPr>
+          <p:cNvPr id="318" name="Google Shape;318;g5e30033d13_0_165:notes"/>
+          <p:cNvSpPr>
+            <a:spLocks noGrp="1" noRot="1" noChangeAspect="1"/>
+          </p:cNvSpPr>
+          <p:nvPr>
+            <p:ph type="sldImg" idx="2"/>
+          </p:nvPr>
+        </p:nvSpPr>
+        <p:spPr>
+          <a:xfrm>
+            <a:off x="381000" y="685800"/>
+            <a:ext cx="6096000" cy="3429000"/>
+          </a:xfrm>
+          <a:custGeom>
+            <a:avLst/>
+            <a:gdLst/>
+            <a:ahLst/>
+            <a:cxnLst/>
+            <a:rect l="l" t="t" r="r" b="b"/>
+            <a:pathLst>
+              <a:path w="120000" h="120000" extrusionOk="0">
+                <a:moveTo>
+                  <a:pt x="0" y="0"/>
+                </a:moveTo>
+                <a:lnTo>
+                  <a:pt x="120000" y="0"/>
+                </a:lnTo>
+                <a:lnTo>
+                  <a:pt x="120000" y="120000"/>
+                </a:lnTo>
+                <a:lnTo>
+                  <a:pt x="0" y="120000"/>
+                </a:lnTo>
+                <a:close/>
+              </a:path>
+            </a:pathLst>
+          </a:custGeom>
+          <a:noFill/>
+          <a:ln>
+            <a:noFill/>
+          </a:ln>
+        </p:spPr>
+      </p:sp>
+    </p:spTree>
+    <p:extLst>
+      <p:ext uri="{BB962C8B-B14F-4D97-AF65-F5344CB8AC3E}">
+        <p14:creationId xmlns:p14="http://schemas.microsoft.com/office/powerpoint/2010/main" val="208842763"/>
+      </p:ext>
+    </p:extLst>
+  </p:cSld>
+  <p:clrMapOvr>
+    <a:masterClrMapping/>
+  </p:clrMapOvr>
+</p:notes>
+</file>
+
+<file path=ppt/notesSlides/notesSlide13.xml><?xml version="1.0" encoding="utf-8"?>
+<p:notes xmlns:a="http://schemas.openxmlformats.org/drawingml/2006/main" xmlns:r="http://schemas.openxmlformats.org/officeDocument/2006/relationships" xmlns:p="http://schemas.openxmlformats.org/presentationml/2006/main" showMasterSp="0" showMasterPhAnim="0">
+  <p:cSld>
+    <p:spTree>
+      <p:nvGrpSpPr>
+        <p:cNvPr id="1" name="Shape 316"/>
+        <p:cNvGrpSpPr/>
+        <p:nvPr/>
+      </p:nvGrpSpPr>
+      <p:grpSpPr>
+        <a:xfrm>
+          <a:off x="0" y="0"/>
+          <a:ext cx="0" cy="0"/>
+          <a:chOff x="0" y="0"/>
+          <a:chExt cx="0" cy="0"/>
+        </a:xfrm>
+      </p:grpSpPr>
+      <p:sp>
+        <p:nvSpPr>
+          <p:cNvPr id="317" name="Google Shape;317;g5e30033d13_0_165:notes"/>
+          <p:cNvSpPr txBox="1">
+            <a:spLocks noGrp="1"/>
+          </p:cNvSpPr>
+          <p:nvPr>
+            <p:ph type="body" idx="1"/>
+          </p:nvPr>
+        </p:nvSpPr>
+        <p:spPr>
+          <a:xfrm>
+            <a:off x="914400" y="4343400"/>
+            <a:ext cx="5029200" cy="4114800"/>
+          </a:xfrm>
+          <a:prstGeom prst="rect">
+            <a:avLst/>
+          </a:prstGeom>
+          <a:noFill/>
+          <a:ln>
+            <a:noFill/>
+          </a:ln>
+        </p:spPr>
+        <p:txBody>
+          <a:bodyPr spcFirstLastPara="1" wrap="square" lIns="91425" tIns="45700" rIns="91425" bIns="45700" anchor="t" anchorCtr="0">
+            <a:noAutofit/>
+          </a:bodyPr>
+          <a:lstStyle/>
+          <a:p>
+            <a:pPr marL="0" marR="0" lvl="0" indent="0" algn="l" rtl="0">
+              <a:lnSpc>
+                <a:spcPct val="100000"/>
+              </a:lnSpc>
+              <a:spcBef>
+                <a:spcPts val="0"/>
+              </a:spcBef>
+              <a:spcAft>
+                <a:spcPts val="0"/>
+              </a:spcAft>
+              <a:buClr>
+                <a:srgbClr val="000000"/>
+              </a:buClr>
+              <a:buSzPts val="1400"/>
+              <a:buFont typeface="Arial"/>
+              <a:buNone/>
+            </a:pPr>
+            <a:endParaRPr sz="1200" b="0" i="0" u="none" strike="noStrike" cap="none">
+              <a:solidFill>
+                <a:srgbClr val="000000"/>
+              </a:solidFill>
+              <a:latin typeface="Calibri"/>
+              <a:ea typeface="Calibri"/>
+              <a:cs typeface="Calibri"/>
+              <a:sym typeface="Calibri"/>
+            </a:endParaRPr>
+          </a:p>
+        </p:txBody>
+      </p:sp>
+      <p:sp>
+        <p:nvSpPr>
+          <p:cNvPr id="318" name="Google Shape;318;g5e30033d13_0_165:notes"/>
+          <p:cNvSpPr>
+            <a:spLocks noGrp="1" noRot="1" noChangeAspect="1"/>
+          </p:cNvSpPr>
+          <p:nvPr>
+            <p:ph type="sldImg" idx="2"/>
+          </p:nvPr>
+        </p:nvSpPr>
+        <p:spPr>
+          <a:xfrm>
+            <a:off x="381000" y="685800"/>
+            <a:ext cx="6096000" cy="3429000"/>
+          </a:xfrm>
+          <a:custGeom>
+            <a:avLst/>
+            <a:gdLst/>
+            <a:ahLst/>
+            <a:cxnLst/>
+            <a:rect l="l" t="t" r="r" b="b"/>
+            <a:pathLst>
+              <a:path w="120000" h="120000" extrusionOk="0">
+                <a:moveTo>
+                  <a:pt x="0" y="0"/>
+                </a:moveTo>
+                <a:lnTo>
+                  <a:pt x="120000" y="0"/>
+                </a:lnTo>
+                <a:lnTo>
+                  <a:pt x="120000" y="120000"/>
+                </a:lnTo>
+                <a:lnTo>
+                  <a:pt x="0" y="120000"/>
+                </a:lnTo>
+                <a:close/>
+              </a:path>
+            </a:pathLst>
+          </a:custGeom>
+          <a:noFill/>
+          <a:ln>
+            <a:noFill/>
+          </a:ln>
+        </p:spPr>
+      </p:sp>
+    </p:spTree>
+    <p:extLst>
+      <p:ext uri="{BB962C8B-B14F-4D97-AF65-F5344CB8AC3E}">
+        <p14:creationId xmlns:p14="http://schemas.microsoft.com/office/powerpoint/2010/main" val="4153121213"/>
+      </p:ext>
+    </p:extLst>
+  </p:cSld>
+  <p:clrMapOvr>
+    <a:masterClrMapping/>
+  </p:clrMapOvr>
+</p:notes>
+</file>
+
+<file path=ppt/notesSlides/notesSlide14.xml><?xml version="1.0" encoding="utf-8"?>
+<p:notes xmlns:a="http://schemas.openxmlformats.org/drawingml/2006/main" xmlns:r="http://schemas.openxmlformats.org/officeDocument/2006/relationships" xmlns:p="http://schemas.openxmlformats.org/presentationml/2006/main" showMasterSp="0" showMasterPhAnim="0">
+  <p:cSld>
+    <p:spTree>
+      <p:nvGrpSpPr>
+        <p:cNvPr id="1" name="Shape 316"/>
+        <p:cNvGrpSpPr/>
+        <p:nvPr/>
+      </p:nvGrpSpPr>
+      <p:grpSpPr>
+        <a:xfrm>
+          <a:off x="0" y="0"/>
+          <a:ext cx="0" cy="0"/>
+          <a:chOff x="0" y="0"/>
+          <a:chExt cx="0" cy="0"/>
+        </a:xfrm>
+      </p:grpSpPr>
+      <p:sp>
+        <p:nvSpPr>
+          <p:cNvPr id="317" name="Google Shape;317;g5e30033d13_0_165:notes"/>
+          <p:cNvSpPr txBox="1">
+            <a:spLocks noGrp="1"/>
+          </p:cNvSpPr>
+          <p:nvPr>
+            <p:ph type="body" idx="1"/>
+          </p:nvPr>
+        </p:nvSpPr>
+        <p:spPr>
+          <a:xfrm>
+            <a:off x="914400" y="4343400"/>
+            <a:ext cx="5029200" cy="4114800"/>
+          </a:xfrm>
+          <a:prstGeom prst="rect">
+            <a:avLst/>
+          </a:prstGeom>
+          <a:noFill/>
+          <a:ln>
+            <a:noFill/>
+          </a:ln>
+        </p:spPr>
+        <p:txBody>
+          <a:bodyPr spcFirstLastPara="1" wrap="square" lIns="91425" tIns="45700" rIns="91425" bIns="45700" anchor="t" anchorCtr="0">
+            <a:noAutofit/>
+          </a:bodyPr>
+          <a:lstStyle/>
+          <a:p>
+            <a:pPr marL="0" marR="0" lvl="0" indent="0" algn="l" rtl="0">
+              <a:lnSpc>
+                <a:spcPct val="100000"/>
+              </a:lnSpc>
+              <a:spcBef>
+                <a:spcPts val="0"/>
+              </a:spcBef>
+              <a:spcAft>
+                <a:spcPts val="0"/>
+              </a:spcAft>
+              <a:buClr>
+                <a:srgbClr val="000000"/>
+              </a:buClr>
+              <a:buSzPts val="1400"/>
+              <a:buFont typeface="Arial"/>
+              <a:buNone/>
+            </a:pPr>
+            <a:endParaRPr sz="1200" b="0" i="0" u="none" strike="noStrike" cap="none">
+              <a:solidFill>
+                <a:srgbClr val="000000"/>
+              </a:solidFill>
+              <a:latin typeface="Calibri"/>
+              <a:ea typeface="Calibri"/>
+              <a:cs typeface="Calibri"/>
+              <a:sym typeface="Calibri"/>
+            </a:endParaRPr>
+          </a:p>
+        </p:txBody>
+      </p:sp>
+      <p:sp>
+        <p:nvSpPr>
+          <p:cNvPr id="318" name="Google Shape;318;g5e30033d13_0_165:notes"/>
+          <p:cNvSpPr>
+            <a:spLocks noGrp="1" noRot="1" noChangeAspect="1"/>
+          </p:cNvSpPr>
+          <p:nvPr>
+            <p:ph type="sldImg" idx="2"/>
+          </p:nvPr>
+        </p:nvSpPr>
+        <p:spPr>
+          <a:xfrm>
+            <a:off x="381000" y="685800"/>
+            <a:ext cx="6096000" cy="3429000"/>
+          </a:xfrm>
+          <a:custGeom>
+            <a:avLst/>
+            <a:gdLst/>
+            <a:ahLst/>
+            <a:cxnLst/>
+            <a:rect l="l" t="t" r="r" b="b"/>
+            <a:pathLst>
+              <a:path w="120000" h="120000" extrusionOk="0">
+                <a:moveTo>
+                  <a:pt x="0" y="0"/>
+                </a:moveTo>
+                <a:lnTo>
+                  <a:pt x="120000" y="0"/>
+                </a:lnTo>
+                <a:lnTo>
+                  <a:pt x="120000" y="120000"/>
+                </a:lnTo>
+                <a:lnTo>
+                  <a:pt x="0" y="120000"/>
+                </a:lnTo>
+                <a:close/>
+              </a:path>
+            </a:pathLst>
+          </a:custGeom>
+          <a:noFill/>
+          <a:ln>
+            <a:noFill/>
+          </a:ln>
+        </p:spPr>
+      </p:sp>
+    </p:spTree>
+    <p:extLst>
+      <p:ext uri="{BB962C8B-B14F-4D97-AF65-F5344CB8AC3E}">
+        <p14:creationId xmlns:p14="http://schemas.microsoft.com/office/powerpoint/2010/main" val="2364911185"/>
+      </p:ext>
+    </p:extLst>
+  </p:cSld>
+  <p:clrMapOvr>
+    <a:masterClrMapping/>
+  </p:clrMapOvr>
+</p:notes>
+</file>
+
+<file path=ppt/notesSlides/notesSlide15.xml><?xml version="1.0" encoding="utf-8"?>
 <p:notes xmlns:a="http://schemas.openxmlformats.org/drawingml/2006/main" xmlns:r="http://schemas.openxmlformats.org/officeDocument/2006/relationships" xmlns:p="http://schemas.openxmlformats.org/presentationml/2006/main" showMasterSp="0" showMasterPhAnim="0">
   <p:cSld>
     <p:spTree>
@@ -18216,6 +18623,13 @@
   <p:clrMapOvr>
     <a:masterClrMapping/>
   </p:clrMapOvr>
+  <p:timing>
+    <p:tnLst>
+      <p:par>
+        <p:cTn id="1" dur="indefinite" restart="never" nodeType="tmRoot"/>
+      </p:par>
+    </p:tnLst>
+  </p:timing>
 </p:sld>
 </file>
 
@@ -18432,19 +18846,7 @@
                 <a:cs typeface="Arial"/>
                 <a:sym typeface="Arial"/>
               </a:rPr>
-              <a:t>Định danh là gì</a:t>
-            </a:r>
-            <a:r>
-              <a:rPr lang="vi-VN" smtClean="0">
-                <a:solidFill>
-                  <a:srgbClr val="15537E"/>
-                </a:solidFill>
-                <a:latin typeface="Arial"/>
-                <a:ea typeface="Arial"/>
-                <a:cs typeface="Arial"/>
-                <a:sym typeface="Arial"/>
-              </a:rPr>
-              <a:t>?</a:t>
+              <a:t>Định danh là gì?</a:t>
             </a:r>
             <a:endParaRPr smtClean="0">
               <a:solidFill>
@@ -18629,10 +19031,1877 @@
   <p:clrMapOvr>
     <a:masterClrMapping/>
   </p:clrMapOvr>
+  <p:timing>
+    <p:tnLst>
+      <p:par>
+        <p:cTn id="1" dur="indefinite" restart="never" nodeType="tmRoot"/>
+      </p:par>
+    </p:tnLst>
+  </p:timing>
 </p:sld>
 </file>
 
 <file path=ppt/slides/slide12.xml><?xml version="1.0" encoding="utf-8"?>
+<p:sld xmlns:a="http://schemas.openxmlformats.org/drawingml/2006/main" xmlns:r="http://schemas.openxmlformats.org/officeDocument/2006/relationships" xmlns:p="http://schemas.openxmlformats.org/presentationml/2006/main">
+  <p:cSld>
+    <p:spTree>
+      <p:nvGrpSpPr>
+        <p:cNvPr id="1" name="Shape 319"/>
+        <p:cNvGrpSpPr/>
+        <p:nvPr/>
+      </p:nvGrpSpPr>
+      <p:grpSpPr>
+        <a:xfrm>
+          <a:off x="0" y="0"/>
+          <a:ext cx="0" cy="0"/>
+          <a:chOff x="0" y="0"/>
+          <a:chExt cx="0" cy="0"/>
+        </a:xfrm>
+      </p:grpSpPr>
+      <p:sp>
+        <p:nvSpPr>
+          <p:cNvPr id="320" name="Google Shape;320;p41"/>
+          <p:cNvSpPr txBox="1">
+            <a:spLocks noGrp="1"/>
+          </p:cNvSpPr>
+          <p:nvPr>
+            <p:ph type="title"/>
+          </p:nvPr>
+        </p:nvSpPr>
+        <p:spPr>
+          <a:xfrm>
+            <a:off x="498103" y="123975"/>
+            <a:ext cx="10114200" cy="680100"/>
+          </a:xfrm>
+          <a:prstGeom prst="rect">
+            <a:avLst/>
+          </a:prstGeom>
+          <a:noFill/>
+          <a:ln>
+            <a:noFill/>
+          </a:ln>
+        </p:spPr>
+        <p:txBody>
+          <a:bodyPr spcFirstLastPara="1" wrap="square" lIns="45700" tIns="45700" rIns="45700" bIns="45700" anchor="t" anchorCtr="0">
+            <a:noAutofit/>
+          </a:bodyPr>
+          <a:lstStyle/>
+          <a:p>
+            <a:pPr marL="0" lvl="0" indent="0" algn="l" rtl="0">
+              <a:lnSpc>
+                <a:spcPct val="100000"/>
+              </a:lnSpc>
+              <a:spcBef>
+                <a:spcPts val="0"/>
+              </a:spcBef>
+              <a:spcAft>
+                <a:spcPts val="0"/>
+              </a:spcAft>
+              <a:buClr>
+                <a:schemeClr val="dk1"/>
+              </a:buClr>
+              <a:buSzPts val="1100"/>
+              <a:buFont typeface="Arial"/>
+              <a:buNone/>
+            </a:pPr>
+            <a:r>
+              <a:rPr lang="en-US" b="1" smtClean="0">
+                <a:solidFill>
+                  <a:srgbClr val="5CC2A8"/>
+                </a:solidFill>
+                <a:latin typeface="Arial"/>
+                <a:ea typeface="Arial"/>
+                <a:cs typeface="Arial"/>
+                <a:sym typeface="Arial"/>
+              </a:rPr>
+              <a:t>Bài tập</a:t>
+            </a:r>
+            <a:endParaRPr b="1">
+              <a:solidFill>
+                <a:srgbClr val="5CC2A8"/>
+              </a:solidFill>
+              <a:latin typeface="Arial"/>
+              <a:ea typeface="Arial"/>
+              <a:cs typeface="Arial"/>
+              <a:sym typeface="Arial"/>
+            </a:endParaRPr>
+          </a:p>
+          <a:p>
+            <a:pPr marL="0" marR="0" lvl="0" indent="0" algn="l" rtl="0">
+              <a:lnSpc>
+                <a:spcPct val="90000"/>
+              </a:lnSpc>
+              <a:spcBef>
+                <a:spcPts val="0"/>
+              </a:spcBef>
+              <a:spcAft>
+                <a:spcPts val="0"/>
+              </a:spcAft>
+              <a:buNone/>
+            </a:pPr>
+            <a:endParaRPr>
+              <a:solidFill>
+                <a:srgbClr val="157359"/>
+              </a:solidFill>
+            </a:endParaRPr>
+          </a:p>
+          <a:p>
+            <a:pPr lvl="0">
+              <a:buClr>
+                <a:srgbClr val="15537E"/>
+              </a:buClr>
+            </a:pPr>
+            <a:r>
+              <a:rPr lang="vi-VN" smtClean="0">
+                <a:solidFill>
+                  <a:srgbClr val="15537E"/>
+                </a:solidFill>
+                <a:latin typeface="Arial"/>
+                <a:ea typeface="Arial"/>
+                <a:cs typeface="Arial"/>
+                <a:sym typeface="Arial"/>
+              </a:rPr>
+              <a:t>Câu </a:t>
+            </a:r>
+            <a:r>
+              <a:rPr lang="vi-VN">
+                <a:solidFill>
+                  <a:srgbClr val="15537E"/>
+                </a:solidFill>
+                <a:latin typeface="Arial"/>
+                <a:ea typeface="Arial"/>
+                <a:cs typeface="Arial"/>
+                <a:sym typeface="Arial"/>
+              </a:rPr>
+              <a:t>lệnh nào sẽ tạo ra một số ngẫu nhiên từ 1 đến </a:t>
+            </a:r>
+            <a:r>
+              <a:rPr lang="vi-VN">
+                <a:solidFill>
+                  <a:srgbClr val="15537E"/>
+                </a:solidFill>
+                <a:latin typeface="Arial"/>
+                <a:ea typeface="Arial"/>
+                <a:cs typeface="Arial"/>
+                <a:sym typeface="Arial"/>
+              </a:rPr>
+              <a:t>10 </a:t>
+            </a:r>
+            <a:r>
+              <a:rPr lang="en-US">
+                <a:solidFill>
+                  <a:srgbClr val="15537E"/>
+                </a:solidFill>
+                <a:latin typeface="Arial"/>
+                <a:ea typeface="Arial"/>
+                <a:cs typeface="Arial"/>
+                <a:sym typeface="Arial"/>
+              </a:rPr>
+              <a:t/>
+            </a:r>
+            <a:br>
+              <a:rPr lang="en-US">
+                <a:solidFill>
+                  <a:srgbClr val="15537E"/>
+                </a:solidFill>
+                <a:latin typeface="Arial"/>
+                <a:ea typeface="Arial"/>
+                <a:cs typeface="Arial"/>
+                <a:sym typeface="Arial"/>
+              </a:rPr>
+            </a:br>
+            <a:r>
+              <a:rPr lang="en-US">
+                <a:solidFill>
+                  <a:srgbClr val="15537E"/>
+                </a:solidFill>
+                <a:latin typeface="Arial"/>
+                <a:ea typeface="Arial"/>
+                <a:cs typeface="Arial"/>
+                <a:sym typeface="Arial"/>
+              </a:rPr>
+              <a:t>A</a:t>
+            </a:r>
+            <a:r>
+              <a:rPr lang="en-US">
+                <a:solidFill>
+                  <a:srgbClr val="15537E"/>
+                </a:solidFill>
+                <a:latin typeface="Arial"/>
+                <a:ea typeface="Arial"/>
+                <a:cs typeface="Arial"/>
+                <a:sym typeface="Arial"/>
+              </a:rPr>
+              <a:t>. </a:t>
+            </a:r>
+            <a:r>
+              <a:rPr lang="en-US" smtClean="0">
+                <a:solidFill>
+                  <a:srgbClr val="15537E"/>
+                </a:solidFill>
+                <a:latin typeface="Arial"/>
+                <a:ea typeface="Arial"/>
+                <a:cs typeface="Arial"/>
+                <a:sym typeface="Arial"/>
+              </a:rPr>
+              <a:t>Num </a:t>
+            </a:r>
+            <a:r>
+              <a:rPr lang="en-US">
+                <a:solidFill>
+                  <a:srgbClr val="15537E"/>
+                </a:solidFill>
+                <a:latin typeface="Arial"/>
+                <a:ea typeface="Arial"/>
+                <a:cs typeface="Arial"/>
+                <a:sym typeface="Arial"/>
+              </a:rPr>
+              <a:t>= random.randint(1,100</a:t>
+            </a:r>
+            <a:r>
+              <a:rPr lang="en-US">
+                <a:solidFill>
+                  <a:srgbClr val="15537E"/>
+                </a:solidFill>
+                <a:latin typeface="Arial"/>
+                <a:ea typeface="Arial"/>
+                <a:cs typeface="Arial"/>
+                <a:sym typeface="Arial"/>
+              </a:rPr>
+              <a:t>)%</a:t>
+            </a:r>
+            <a:r>
+              <a:rPr lang="en-US">
+                <a:solidFill>
+                  <a:srgbClr val="15537E"/>
+                </a:solidFill>
+                <a:latin typeface="Arial"/>
+                <a:ea typeface="Arial"/>
+                <a:cs typeface="Arial"/>
+                <a:sym typeface="Arial"/>
+              </a:rPr>
+              <a:t>10</a:t>
+            </a:r>
+            <a:br>
+              <a:rPr lang="en-US">
+                <a:solidFill>
+                  <a:srgbClr val="15537E"/>
+                </a:solidFill>
+                <a:latin typeface="Arial"/>
+                <a:ea typeface="Arial"/>
+                <a:cs typeface="Arial"/>
+                <a:sym typeface="Arial"/>
+              </a:rPr>
+            </a:br>
+            <a:r>
+              <a:rPr lang="en-US">
+                <a:solidFill>
+                  <a:srgbClr val="15537E"/>
+                </a:solidFill>
+                <a:latin typeface="Arial"/>
+                <a:ea typeface="Arial"/>
+                <a:cs typeface="Arial"/>
+                <a:sym typeface="Arial"/>
+              </a:rPr>
+              <a:t>B. Num = randint(1,10</a:t>
+            </a:r>
+            <a:r>
+              <a:rPr lang="en-US">
+                <a:solidFill>
+                  <a:srgbClr val="15537E"/>
+                </a:solidFill>
+                <a:latin typeface="Arial"/>
+                <a:ea typeface="Arial"/>
+                <a:cs typeface="Arial"/>
+                <a:sym typeface="Arial"/>
+              </a:rPr>
+              <a:t>) </a:t>
+            </a:r>
+            <a:r>
+              <a:rPr lang="en-US">
+                <a:solidFill>
+                  <a:srgbClr val="15537E"/>
+                </a:solidFill>
+                <a:latin typeface="Arial"/>
+                <a:ea typeface="Arial"/>
+                <a:cs typeface="Arial"/>
+                <a:sym typeface="Arial"/>
+              </a:rPr>
+              <a:t/>
+            </a:r>
+            <a:br>
+              <a:rPr lang="en-US">
+                <a:solidFill>
+                  <a:srgbClr val="15537E"/>
+                </a:solidFill>
+                <a:latin typeface="Arial"/>
+                <a:ea typeface="Arial"/>
+                <a:cs typeface="Arial"/>
+                <a:sym typeface="Arial"/>
+              </a:rPr>
+            </a:br>
+            <a:r>
+              <a:rPr lang="en-US">
+                <a:solidFill>
+                  <a:srgbClr val="15537E"/>
+                </a:solidFill>
+                <a:latin typeface="Arial"/>
+                <a:ea typeface="Arial"/>
+                <a:cs typeface="Arial"/>
+                <a:sym typeface="Arial"/>
+              </a:rPr>
+              <a:t>C. Num = random.int(1,100</a:t>
+            </a:r>
+            <a:r>
+              <a:rPr lang="en-US">
+                <a:solidFill>
+                  <a:srgbClr val="15537E"/>
+                </a:solidFill>
+                <a:latin typeface="Arial"/>
+                <a:ea typeface="Arial"/>
+                <a:cs typeface="Arial"/>
+                <a:sym typeface="Arial"/>
+              </a:rPr>
+              <a:t>) </a:t>
+            </a:r>
+            <a:r>
+              <a:rPr lang="en-US">
+                <a:solidFill>
+                  <a:srgbClr val="15537E"/>
+                </a:solidFill>
+                <a:latin typeface="Arial"/>
+                <a:ea typeface="Arial"/>
+                <a:cs typeface="Arial"/>
+                <a:sym typeface="Arial"/>
+              </a:rPr>
+              <a:t/>
+            </a:r>
+            <a:br>
+              <a:rPr lang="en-US">
+                <a:solidFill>
+                  <a:srgbClr val="15537E"/>
+                </a:solidFill>
+                <a:latin typeface="Arial"/>
+                <a:ea typeface="Arial"/>
+                <a:cs typeface="Arial"/>
+                <a:sym typeface="Arial"/>
+              </a:rPr>
+            </a:br>
+            <a:r>
+              <a:rPr lang="en-US">
+                <a:solidFill>
+                  <a:srgbClr val="15537E"/>
+                </a:solidFill>
+                <a:latin typeface="Arial"/>
+                <a:ea typeface="Arial"/>
+                <a:cs typeface="Arial"/>
+                <a:sym typeface="Arial"/>
+              </a:rPr>
+              <a:t>D. Num = </a:t>
+            </a:r>
+            <a:r>
+              <a:rPr lang="en-US">
+                <a:solidFill>
+                  <a:srgbClr val="15537E"/>
+                </a:solidFill>
+                <a:latin typeface="Arial"/>
+                <a:ea typeface="Arial"/>
+                <a:cs typeface="Arial"/>
+                <a:sym typeface="Arial"/>
+              </a:rPr>
+              <a:t>random.int(1,10</a:t>
+            </a:r>
+            <a:r>
+              <a:rPr lang="en-US" smtClean="0">
+                <a:solidFill>
+                  <a:srgbClr val="15537E"/>
+                </a:solidFill>
+                <a:latin typeface="Arial"/>
+                <a:ea typeface="Arial"/>
+                <a:cs typeface="Arial"/>
+                <a:sym typeface="Arial"/>
+              </a:rPr>
+              <a:t>)</a:t>
+            </a:r>
+            <a:endParaRPr>
+              <a:solidFill>
+                <a:srgbClr val="157359"/>
+              </a:solidFill>
+            </a:endParaRPr>
+          </a:p>
+        </p:txBody>
+      </p:sp>
+      <p:grpSp>
+        <p:nvGrpSpPr>
+          <p:cNvPr id="321" name="Google Shape;321;p41"/>
+          <p:cNvGrpSpPr/>
+          <p:nvPr/>
+        </p:nvGrpSpPr>
+        <p:grpSpPr>
+          <a:xfrm>
+            <a:off x="498103" y="93784"/>
+            <a:ext cx="11423100" cy="710181"/>
+            <a:chOff x="-129" y="0"/>
+            <a:chExt cx="11423100" cy="710181"/>
+          </a:xfrm>
+        </p:grpSpPr>
+        <p:pic>
+          <p:nvPicPr>
+            <p:cNvPr id="322" name="Google Shape;322;p41"/>
+            <p:cNvPicPr preferRelativeResize="0"/>
+            <p:nvPr/>
+          </p:nvPicPr>
+          <p:blipFill rotWithShape="1">
+            <a:blip r:embed="rId3">
+              <a:alphaModFix/>
+            </a:blip>
+            <a:srcRect/>
+            <a:stretch/>
+          </p:blipFill>
+          <p:spPr>
+            <a:xfrm>
+              <a:off x="9747737" y="0"/>
+              <a:ext cx="1675234" cy="575196"/>
+            </a:xfrm>
+            <a:prstGeom prst="rect">
+              <a:avLst/>
+            </a:prstGeom>
+            <a:noFill/>
+            <a:ln>
+              <a:noFill/>
+            </a:ln>
+          </p:spPr>
+        </p:pic>
+        <p:cxnSp>
+          <p:nvCxnSpPr>
+            <p:cNvPr id="323" name="Google Shape;323;p41"/>
+            <p:cNvCxnSpPr/>
+            <p:nvPr/>
+          </p:nvCxnSpPr>
+          <p:spPr>
+            <a:xfrm rot="10800000">
+              <a:off x="-129" y="710181"/>
+              <a:ext cx="11423100" cy="0"/>
+            </a:xfrm>
+            <a:prstGeom prst="straightConnector1">
+              <a:avLst/>
+            </a:prstGeom>
+            <a:noFill/>
+            <a:ln w="9525" cap="flat" cmpd="sng">
+              <a:solidFill>
+                <a:srgbClr val="AAE2D3"/>
+              </a:solidFill>
+              <a:prstDash val="solid"/>
+              <a:miter lim="800000"/>
+              <a:headEnd type="none" w="sm" len="sm"/>
+              <a:tailEnd type="none" w="sm" len="sm"/>
+            </a:ln>
+          </p:spPr>
+        </p:cxnSp>
+      </p:grpSp>
+      <p:sp>
+        <p:nvSpPr>
+          <p:cNvPr id="2" name="TextBox 1"/>
+          <p:cNvSpPr txBox="1"/>
+          <p:nvPr/>
+        </p:nvSpPr>
+        <p:spPr>
+          <a:xfrm>
+            <a:off x="498103" y="5499100"/>
+            <a:ext cx="2696572" cy="769441"/>
+          </a:xfrm>
+          <a:prstGeom prst="rect">
+            <a:avLst/>
+          </a:prstGeom>
+          <a:noFill/>
+        </p:spPr>
+        <p:txBody>
+          <a:bodyPr wrap="none" rtlCol="0">
+            <a:spAutoFit/>
+          </a:bodyPr>
+          <a:lstStyle/>
+          <a:p>
+            <a:r>
+              <a:rPr lang="en-US" sz="4400" smtClean="0">
+                <a:solidFill>
+                  <a:srgbClr val="15537E"/>
+                </a:solidFill>
+              </a:rPr>
+              <a:t>Đáp án: B</a:t>
+            </a:r>
+            <a:endParaRPr lang="en-US" sz="4400"/>
+          </a:p>
+        </p:txBody>
+      </p:sp>
+    </p:spTree>
+    <p:extLst>
+      <p:ext uri="{BB962C8B-B14F-4D97-AF65-F5344CB8AC3E}">
+        <p14:creationId xmlns:p14="http://schemas.microsoft.com/office/powerpoint/2010/main" val="3967504413"/>
+      </p:ext>
+    </p:extLst>
+  </p:cSld>
+  <p:clrMapOvr>
+    <a:masterClrMapping/>
+  </p:clrMapOvr>
+  <p:timing>
+    <p:tnLst>
+      <p:par>
+        <p:cTn id="1" dur="indefinite" restart="never" nodeType="tmRoot">
+          <p:childTnLst>
+            <p:seq concurrent="1" nextAc="seek">
+              <p:cTn id="2" dur="indefinite" nodeType="mainSeq">
+                <p:childTnLst>
+                  <p:par>
+                    <p:cTn id="3" fill="hold">
+                      <p:stCondLst>
+                        <p:cond delay="indefinite"/>
+                      </p:stCondLst>
+                      <p:childTnLst>
+                        <p:par>
+                          <p:cTn id="4" fill="hold">
+                            <p:stCondLst>
+                              <p:cond delay="0"/>
+                            </p:stCondLst>
+                            <p:childTnLst>
+                              <p:par>
+                                <p:cTn id="5" presetID="42" presetClass="entr" presetSubtype="0" fill="hold" grpId="0" nodeType="clickEffect">
+                                  <p:stCondLst>
+                                    <p:cond delay="0"/>
+                                  </p:stCondLst>
+                                  <p:childTnLst>
+                                    <p:set>
+                                      <p:cBhvr>
+                                        <p:cTn id="6" dur="1" fill="hold">
+                                          <p:stCondLst>
+                                            <p:cond delay="0"/>
+                                          </p:stCondLst>
+                                        </p:cTn>
+                                        <p:tgtEl>
+                                          <p:spTgt spid="320"/>
+                                        </p:tgtEl>
+                                        <p:attrNameLst>
+                                          <p:attrName>style.visibility</p:attrName>
+                                        </p:attrNameLst>
+                                      </p:cBhvr>
+                                      <p:to>
+                                        <p:strVal val="visible"/>
+                                      </p:to>
+                                    </p:set>
+                                    <p:animEffect transition="in" filter="fade">
+                                      <p:cBhvr>
+                                        <p:cTn id="7" dur="1000"/>
+                                        <p:tgtEl>
+                                          <p:spTgt spid="320"/>
+                                        </p:tgtEl>
+                                      </p:cBhvr>
+                                    </p:animEffect>
+                                    <p:anim calcmode="lin" valueType="num">
+                                      <p:cBhvr>
+                                        <p:cTn id="8" dur="1000" fill="hold"/>
+                                        <p:tgtEl>
+                                          <p:spTgt spid="320"/>
+                                        </p:tgtEl>
+                                        <p:attrNameLst>
+                                          <p:attrName>ppt_x</p:attrName>
+                                        </p:attrNameLst>
+                                      </p:cBhvr>
+                                      <p:tavLst>
+                                        <p:tav tm="0">
+                                          <p:val>
+                                            <p:strVal val="#ppt_x"/>
+                                          </p:val>
+                                        </p:tav>
+                                        <p:tav tm="100000">
+                                          <p:val>
+                                            <p:strVal val="#ppt_x"/>
+                                          </p:val>
+                                        </p:tav>
+                                      </p:tavLst>
+                                    </p:anim>
+                                    <p:anim calcmode="lin" valueType="num">
+                                      <p:cBhvr>
+                                        <p:cTn id="9" dur="1000" fill="hold"/>
+                                        <p:tgtEl>
+                                          <p:spTgt spid="320"/>
+                                        </p:tgtEl>
+                                        <p:attrNameLst>
+                                          <p:attrName>ppt_y</p:attrName>
+                                        </p:attrNameLst>
+                                      </p:cBhvr>
+                                      <p:tavLst>
+                                        <p:tav tm="0">
+                                          <p:val>
+                                            <p:strVal val="#ppt_y+.1"/>
+                                          </p:val>
+                                        </p:tav>
+                                        <p:tav tm="100000">
+                                          <p:val>
+                                            <p:strVal val="#ppt_y"/>
+                                          </p:val>
+                                        </p:tav>
+                                      </p:tavLst>
+                                    </p:anim>
+                                  </p:childTnLst>
+                                </p:cTn>
+                              </p:par>
+                            </p:childTnLst>
+                          </p:cTn>
+                        </p:par>
+                      </p:childTnLst>
+                    </p:cTn>
+                  </p:par>
+                  <p:par>
+                    <p:cTn id="10" fill="hold">
+                      <p:stCondLst>
+                        <p:cond delay="indefinite"/>
+                      </p:stCondLst>
+                      <p:childTnLst>
+                        <p:par>
+                          <p:cTn id="11" fill="hold">
+                            <p:stCondLst>
+                              <p:cond delay="0"/>
+                            </p:stCondLst>
+                            <p:childTnLst>
+                              <p:par>
+                                <p:cTn id="12" presetID="42" presetClass="entr" presetSubtype="0" fill="hold" grpId="0" nodeType="clickEffect">
+                                  <p:stCondLst>
+                                    <p:cond delay="0"/>
+                                  </p:stCondLst>
+                                  <p:childTnLst>
+                                    <p:set>
+                                      <p:cBhvr>
+                                        <p:cTn id="13" dur="1" fill="hold">
+                                          <p:stCondLst>
+                                            <p:cond delay="0"/>
+                                          </p:stCondLst>
+                                        </p:cTn>
+                                        <p:tgtEl>
+                                          <p:spTgt spid="2"/>
+                                        </p:tgtEl>
+                                        <p:attrNameLst>
+                                          <p:attrName>style.visibility</p:attrName>
+                                        </p:attrNameLst>
+                                      </p:cBhvr>
+                                      <p:to>
+                                        <p:strVal val="visible"/>
+                                      </p:to>
+                                    </p:set>
+                                    <p:animEffect transition="in" filter="fade">
+                                      <p:cBhvr>
+                                        <p:cTn id="14" dur="1000"/>
+                                        <p:tgtEl>
+                                          <p:spTgt spid="2"/>
+                                        </p:tgtEl>
+                                      </p:cBhvr>
+                                    </p:animEffect>
+                                    <p:anim calcmode="lin" valueType="num">
+                                      <p:cBhvr>
+                                        <p:cTn id="15" dur="1000" fill="hold"/>
+                                        <p:tgtEl>
+                                          <p:spTgt spid="2"/>
+                                        </p:tgtEl>
+                                        <p:attrNameLst>
+                                          <p:attrName>ppt_x</p:attrName>
+                                        </p:attrNameLst>
+                                      </p:cBhvr>
+                                      <p:tavLst>
+                                        <p:tav tm="0">
+                                          <p:val>
+                                            <p:strVal val="#ppt_x"/>
+                                          </p:val>
+                                        </p:tav>
+                                        <p:tav tm="100000">
+                                          <p:val>
+                                            <p:strVal val="#ppt_x"/>
+                                          </p:val>
+                                        </p:tav>
+                                      </p:tavLst>
+                                    </p:anim>
+                                    <p:anim calcmode="lin" valueType="num">
+                                      <p:cBhvr>
+                                        <p:cTn id="16" dur="1000" fill="hold"/>
+                                        <p:tgtEl>
+                                          <p:spTgt spid="2"/>
+                                        </p:tgtEl>
+                                        <p:attrNameLst>
+                                          <p:attrName>ppt_y</p:attrName>
+                                        </p:attrNameLst>
+                                      </p:cBhvr>
+                                      <p:tavLst>
+                                        <p:tav tm="0">
+                                          <p:val>
+                                            <p:strVal val="#ppt_y+.1"/>
+                                          </p:val>
+                                        </p:tav>
+                                        <p:tav tm="100000">
+                                          <p:val>
+                                            <p:strVal val="#ppt_y"/>
+                                          </p:val>
+                                        </p:tav>
+                                      </p:tavLst>
+                                    </p:anim>
+                                  </p:childTnLst>
+                                </p:cTn>
+                              </p:par>
+                            </p:childTnLst>
+                          </p:cTn>
+                        </p:par>
+                      </p:childTnLst>
+                    </p:cTn>
+                  </p:par>
+                </p:childTnLst>
+              </p:cTn>
+              <p:prevCondLst>
+                <p:cond evt="onPrev" delay="0">
+                  <p:tgtEl>
+                    <p:sldTgt/>
+                  </p:tgtEl>
+                </p:cond>
+              </p:prevCondLst>
+              <p:nextCondLst>
+                <p:cond evt="onNext" delay="0">
+                  <p:tgtEl>
+                    <p:sldTgt/>
+                  </p:tgtEl>
+                </p:cond>
+              </p:nextCondLst>
+            </p:seq>
+          </p:childTnLst>
+        </p:cTn>
+      </p:par>
+    </p:tnLst>
+    <p:bldLst>
+      <p:bldP spid="320" grpId="0"/>
+      <p:bldP spid="2" grpId="0"/>
+    </p:bldLst>
+  </p:timing>
+</p:sld>
+</file>
+
+<file path=ppt/slides/slide13.xml><?xml version="1.0" encoding="utf-8"?>
+<p:sld xmlns:a="http://schemas.openxmlformats.org/drawingml/2006/main" xmlns:r="http://schemas.openxmlformats.org/officeDocument/2006/relationships" xmlns:p="http://schemas.openxmlformats.org/presentationml/2006/main">
+  <p:cSld>
+    <p:spTree>
+      <p:nvGrpSpPr>
+        <p:cNvPr id="1" name="Shape 319"/>
+        <p:cNvGrpSpPr/>
+        <p:nvPr/>
+      </p:nvGrpSpPr>
+      <p:grpSpPr>
+        <a:xfrm>
+          <a:off x="0" y="0"/>
+          <a:ext cx="0" cy="0"/>
+          <a:chOff x="0" y="0"/>
+          <a:chExt cx="0" cy="0"/>
+        </a:xfrm>
+      </p:grpSpPr>
+      <p:sp>
+        <p:nvSpPr>
+          <p:cNvPr id="320" name="Google Shape;320;p41"/>
+          <p:cNvSpPr txBox="1">
+            <a:spLocks noGrp="1"/>
+          </p:cNvSpPr>
+          <p:nvPr>
+            <p:ph type="title"/>
+          </p:nvPr>
+        </p:nvSpPr>
+        <p:spPr>
+          <a:xfrm>
+            <a:off x="498103" y="123975"/>
+            <a:ext cx="10114200" cy="680100"/>
+          </a:xfrm>
+          <a:prstGeom prst="rect">
+            <a:avLst/>
+          </a:prstGeom>
+          <a:noFill/>
+          <a:ln>
+            <a:noFill/>
+          </a:ln>
+        </p:spPr>
+        <p:txBody>
+          <a:bodyPr spcFirstLastPara="1" wrap="square" lIns="45700" tIns="45700" rIns="45700" bIns="45700" anchor="t" anchorCtr="0">
+            <a:noAutofit/>
+          </a:bodyPr>
+          <a:lstStyle/>
+          <a:p>
+            <a:pPr marL="0" lvl="0" indent="0" algn="l" rtl="0">
+              <a:lnSpc>
+                <a:spcPct val="100000"/>
+              </a:lnSpc>
+              <a:spcBef>
+                <a:spcPts val="0"/>
+              </a:spcBef>
+              <a:spcAft>
+                <a:spcPts val="0"/>
+              </a:spcAft>
+              <a:buClr>
+                <a:schemeClr val="dk1"/>
+              </a:buClr>
+              <a:buSzPts val="1100"/>
+              <a:buFont typeface="Arial"/>
+              <a:buNone/>
+            </a:pPr>
+            <a:r>
+              <a:rPr lang="en-US" b="1" smtClean="0">
+                <a:solidFill>
+                  <a:srgbClr val="5CC2A8"/>
+                </a:solidFill>
+                <a:latin typeface="Arial"/>
+                <a:ea typeface="Arial"/>
+                <a:cs typeface="Arial"/>
+                <a:sym typeface="Arial"/>
+              </a:rPr>
+              <a:t>Bài tập</a:t>
+            </a:r>
+            <a:endParaRPr b="1">
+              <a:solidFill>
+                <a:srgbClr val="5CC2A8"/>
+              </a:solidFill>
+              <a:latin typeface="Arial"/>
+              <a:ea typeface="Arial"/>
+              <a:cs typeface="Arial"/>
+              <a:sym typeface="Arial"/>
+            </a:endParaRPr>
+          </a:p>
+          <a:p>
+            <a:pPr lvl="0">
+              <a:buClr>
+                <a:srgbClr val="15537E"/>
+              </a:buClr>
+            </a:pPr>
+            <a:r>
+              <a:rPr lang="vi-VN" smtClean="0">
+                <a:solidFill>
+                  <a:srgbClr val="15537E"/>
+                </a:solidFill>
+                <a:latin typeface="Arial"/>
+                <a:ea typeface="Arial"/>
+                <a:cs typeface="Arial"/>
+                <a:sym typeface="Arial"/>
+              </a:rPr>
+              <a:t>Các </a:t>
+            </a:r>
+            <a:r>
+              <a:rPr lang="vi-VN">
+                <a:solidFill>
+                  <a:srgbClr val="15537E"/>
+                </a:solidFill>
+                <a:latin typeface="Arial"/>
+                <a:ea typeface="Arial"/>
+                <a:cs typeface="Arial"/>
+                <a:sym typeface="Arial"/>
+              </a:rPr>
+              <a:t>em hãy cho biết kết quả của chương </a:t>
+            </a:r>
+            <a:r>
+              <a:rPr lang="vi-VN">
+                <a:solidFill>
+                  <a:srgbClr val="15537E"/>
+                </a:solidFill>
+                <a:latin typeface="Arial"/>
+                <a:ea typeface="Arial"/>
+                <a:cs typeface="Arial"/>
+                <a:sym typeface="Arial"/>
+              </a:rPr>
+              <a:t>trình </a:t>
+            </a:r>
+            <a:r>
+              <a:rPr lang="vi-VN" smtClean="0">
+                <a:solidFill>
+                  <a:srgbClr val="15537E"/>
+                </a:solidFill>
+                <a:latin typeface="Arial"/>
+                <a:ea typeface="Arial"/>
+                <a:cs typeface="Arial"/>
+                <a:sym typeface="Arial"/>
+              </a:rPr>
+              <a:t>sau</a:t>
+            </a:r>
+            <a:r>
+              <a:rPr lang="en-US" smtClean="0">
+                <a:solidFill>
+                  <a:srgbClr val="15537E"/>
+                </a:solidFill>
+                <a:latin typeface="Arial"/>
+                <a:ea typeface="Arial"/>
+                <a:cs typeface="Arial"/>
+                <a:sym typeface="Arial"/>
+              </a:rPr>
+              <a:t>:</a:t>
+            </a:r>
+            <a:r>
+              <a:rPr lang="en-US">
+                <a:solidFill>
+                  <a:srgbClr val="15537E"/>
+                </a:solidFill>
+                <a:latin typeface="Arial"/>
+                <a:ea typeface="Arial"/>
+                <a:cs typeface="Arial"/>
+                <a:sym typeface="Arial"/>
+              </a:rPr>
+              <a:t/>
+            </a:r>
+            <a:br>
+              <a:rPr lang="en-US">
+                <a:solidFill>
+                  <a:srgbClr val="15537E"/>
+                </a:solidFill>
+                <a:latin typeface="Arial"/>
+                <a:ea typeface="Arial"/>
+                <a:cs typeface="Arial"/>
+                <a:sym typeface="Arial"/>
+              </a:rPr>
+            </a:br>
+            <a:endParaRPr>
+              <a:solidFill>
+                <a:srgbClr val="157359"/>
+              </a:solidFill>
+            </a:endParaRPr>
+          </a:p>
+        </p:txBody>
+      </p:sp>
+      <p:grpSp>
+        <p:nvGrpSpPr>
+          <p:cNvPr id="321" name="Google Shape;321;p41"/>
+          <p:cNvGrpSpPr/>
+          <p:nvPr/>
+        </p:nvGrpSpPr>
+        <p:grpSpPr>
+          <a:xfrm>
+            <a:off x="498103" y="93784"/>
+            <a:ext cx="11423100" cy="710181"/>
+            <a:chOff x="-129" y="0"/>
+            <a:chExt cx="11423100" cy="710181"/>
+          </a:xfrm>
+        </p:grpSpPr>
+        <p:pic>
+          <p:nvPicPr>
+            <p:cNvPr id="322" name="Google Shape;322;p41"/>
+            <p:cNvPicPr preferRelativeResize="0"/>
+            <p:nvPr/>
+          </p:nvPicPr>
+          <p:blipFill rotWithShape="1">
+            <a:blip r:embed="rId3">
+              <a:alphaModFix/>
+            </a:blip>
+            <a:srcRect/>
+            <a:stretch/>
+          </p:blipFill>
+          <p:spPr>
+            <a:xfrm>
+              <a:off x="9747737" y="0"/>
+              <a:ext cx="1675234" cy="575196"/>
+            </a:xfrm>
+            <a:prstGeom prst="rect">
+              <a:avLst/>
+            </a:prstGeom>
+            <a:noFill/>
+            <a:ln>
+              <a:noFill/>
+            </a:ln>
+          </p:spPr>
+        </p:pic>
+        <p:cxnSp>
+          <p:nvCxnSpPr>
+            <p:cNvPr id="323" name="Google Shape;323;p41"/>
+            <p:cNvCxnSpPr/>
+            <p:nvPr/>
+          </p:nvCxnSpPr>
+          <p:spPr>
+            <a:xfrm rot="10800000">
+              <a:off x="-129" y="710181"/>
+              <a:ext cx="11423100" cy="0"/>
+            </a:xfrm>
+            <a:prstGeom prst="straightConnector1">
+              <a:avLst/>
+            </a:prstGeom>
+            <a:noFill/>
+            <a:ln w="9525" cap="flat" cmpd="sng">
+              <a:solidFill>
+                <a:srgbClr val="AAE2D3"/>
+              </a:solidFill>
+              <a:prstDash val="solid"/>
+              <a:miter lim="800000"/>
+              <a:headEnd type="none" w="sm" len="sm"/>
+              <a:tailEnd type="none" w="sm" len="sm"/>
+            </a:ln>
+          </p:spPr>
+        </p:cxnSp>
+      </p:grpSp>
+      <p:pic>
+        <p:nvPicPr>
+          <p:cNvPr id="3" name="Picture 2"/>
+          <p:cNvPicPr>
+            <a:picLocks noChangeAspect="1"/>
+          </p:cNvPicPr>
+          <p:nvPr/>
+        </p:nvPicPr>
+        <p:blipFill>
+          <a:blip r:embed="rId4">
+            <a:extLst>
+              <a:ext uri="{28A0092B-C50C-407E-A947-70E740481C1C}">
+                <a14:useLocalDpi xmlns:a14="http://schemas.microsoft.com/office/drawing/2010/main" val="0"/>
+              </a:ext>
+            </a:extLst>
+          </a:blip>
+          <a:stretch>
+            <a:fillRect/>
+          </a:stretch>
+        </p:blipFill>
+        <p:spPr>
+          <a:xfrm>
+            <a:off x="675903" y="2277770"/>
+            <a:ext cx="9833797" cy="4173829"/>
+          </a:xfrm>
+          <a:prstGeom prst="rect">
+            <a:avLst/>
+          </a:prstGeom>
+        </p:spPr>
+      </p:pic>
+    </p:spTree>
+    <p:extLst>
+      <p:ext uri="{BB962C8B-B14F-4D97-AF65-F5344CB8AC3E}">
+        <p14:creationId xmlns:p14="http://schemas.microsoft.com/office/powerpoint/2010/main" val="46328562"/>
+      </p:ext>
+    </p:extLst>
+  </p:cSld>
+  <p:clrMapOvr>
+    <a:masterClrMapping/>
+  </p:clrMapOvr>
+  <p:timing>
+    <p:tnLst>
+      <p:par>
+        <p:cTn id="1" dur="indefinite" restart="never" nodeType="tmRoot">
+          <p:childTnLst>
+            <p:seq concurrent="1" nextAc="seek">
+              <p:cTn id="2" dur="indefinite" nodeType="mainSeq">
+                <p:childTnLst>
+                  <p:par>
+                    <p:cTn id="3" fill="hold">
+                      <p:stCondLst>
+                        <p:cond delay="indefinite"/>
+                      </p:stCondLst>
+                      <p:childTnLst>
+                        <p:par>
+                          <p:cTn id="4" fill="hold">
+                            <p:stCondLst>
+                              <p:cond delay="0"/>
+                            </p:stCondLst>
+                            <p:childTnLst>
+                              <p:par>
+                                <p:cTn id="5" presetID="42" presetClass="entr" presetSubtype="0" fill="hold" grpId="0" nodeType="clickEffect">
+                                  <p:stCondLst>
+                                    <p:cond delay="0"/>
+                                  </p:stCondLst>
+                                  <p:childTnLst>
+                                    <p:set>
+                                      <p:cBhvr>
+                                        <p:cTn id="6" dur="1" fill="hold">
+                                          <p:stCondLst>
+                                            <p:cond delay="0"/>
+                                          </p:stCondLst>
+                                        </p:cTn>
+                                        <p:tgtEl>
+                                          <p:spTgt spid="320"/>
+                                        </p:tgtEl>
+                                        <p:attrNameLst>
+                                          <p:attrName>style.visibility</p:attrName>
+                                        </p:attrNameLst>
+                                      </p:cBhvr>
+                                      <p:to>
+                                        <p:strVal val="visible"/>
+                                      </p:to>
+                                    </p:set>
+                                    <p:animEffect transition="in" filter="fade">
+                                      <p:cBhvr>
+                                        <p:cTn id="7" dur="1000"/>
+                                        <p:tgtEl>
+                                          <p:spTgt spid="320"/>
+                                        </p:tgtEl>
+                                      </p:cBhvr>
+                                    </p:animEffect>
+                                    <p:anim calcmode="lin" valueType="num">
+                                      <p:cBhvr>
+                                        <p:cTn id="8" dur="1000" fill="hold"/>
+                                        <p:tgtEl>
+                                          <p:spTgt spid="320"/>
+                                        </p:tgtEl>
+                                        <p:attrNameLst>
+                                          <p:attrName>ppt_x</p:attrName>
+                                        </p:attrNameLst>
+                                      </p:cBhvr>
+                                      <p:tavLst>
+                                        <p:tav tm="0">
+                                          <p:val>
+                                            <p:strVal val="#ppt_x"/>
+                                          </p:val>
+                                        </p:tav>
+                                        <p:tav tm="100000">
+                                          <p:val>
+                                            <p:strVal val="#ppt_x"/>
+                                          </p:val>
+                                        </p:tav>
+                                      </p:tavLst>
+                                    </p:anim>
+                                    <p:anim calcmode="lin" valueType="num">
+                                      <p:cBhvr>
+                                        <p:cTn id="9" dur="1000" fill="hold"/>
+                                        <p:tgtEl>
+                                          <p:spTgt spid="320"/>
+                                        </p:tgtEl>
+                                        <p:attrNameLst>
+                                          <p:attrName>ppt_y</p:attrName>
+                                        </p:attrNameLst>
+                                      </p:cBhvr>
+                                      <p:tavLst>
+                                        <p:tav tm="0">
+                                          <p:val>
+                                            <p:strVal val="#ppt_y+.1"/>
+                                          </p:val>
+                                        </p:tav>
+                                        <p:tav tm="100000">
+                                          <p:val>
+                                            <p:strVal val="#ppt_y"/>
+                                          </p:val>
+                                        </p:tav>
+                                      </p:tavLst>
+                                    </p:anim>
+                                  </p:childTnLst>
+                                </p:cTn>
+                              </p:par>
+                            </p:childTnLst>
+                          </p:cTn>
+                        </p:par>
+                      </p:childTnLst>
+                    </p:cTn>
+                  </p:par>
+                </p:childTnLst>
+              </p:cTn>
+              <p:prevCondLst>
+                <p:cond evt="onPrev" delay="0">
+                  <p:tgtEl>
+                    <p:sldTgt/>
+                  </p:tgtEl>
+                </p:cond>
+              </p:prevCondLst>
+              <p:nextCondLst>
+                <p:cond evt="onNext" delay="0">
+                  <p:tgtEl>
+                    <p:sldTgt/>
+                  </p:tgtEl>
+                </p:cond>
+              </p:nextCondLst>
+            </p:seq>
+          </p:childTnLst>
+        </p:cTn>
+      </p:par>
+    </p:tnLst>
+    <p:bldLst>
+      <p:bldP spid="320" grpId="0"/>
+    </p:bldLst>
+  </p:timing>
+</p:sld>
+</file>
+
+<file path=ppt/slides/slide14.xml><?xml version="1.0" encoding="utf-8"?>
+<p:sld xmlns:a="http://schemas.openxmlformats.org/drawingml/2006/main" xmlns:r="http://schemas.openxmlformats.org/officeDocument/2006/relationships" xmlns:p="http://schemas.openxmlformats.org/presentationml/2006/main">
+  <p:cSld>
+    <p:spTree>
+      <p:nvGrpSpPr>
+        <p:cNvPr id="1" name="Shape 319"/>
+        <p:cNvGrpSpPr/>
+        <p:nvPr/>
+      </p:nvGrpSpPr>
+      <p:grpSpPr>
+        <a:xfrm>
+          <a:off x="0" y="0"/>
+          <a:ext cx="0" cy="0"/>
+          <a:chOff x="0" y="0"/>
+          <a:chExt cx="0" cy="0"/>
+        </a:xfrm>
+      </p:grpSpPr>
+      <p:sp>
+        <p:nvSpPr>
+          <p:cNvPr id="320" name="Google Shape;320;p41"/>
+          <p:cNvSpPr txBox="1">
+            <a:spLocks noGrp="1"/>
+          </p:cNvSpPr>
+          <p:nvPr>
+            <p:ph type="title"/>
+          </p:nvPr>
+        </p:nvSpPr>
+        <p:spPr>
+          <a:xfrm>
+            <a:off x="498102" y="123975"/>
+            <a:ext cx="9747867" cy="680100"/>
+          </a:xfrm>
+          <a:prstGeom prst="rect">
+            <a:avLst/>
+          </a:prstGeom>
+          <a:noFill/>
+          <a:ln>
+            <a:noFill/>
+          </a:ln>
+        </p:spPr>
+        <p:txBody>
+          <a:bodyPr spcFirstLastPara="1" wrap="square" lIns="45700" tIns="45700" rIns="45700" bIns="45700" anchor="t" anchorCtr="0">
+            <a:noAutofit/>
+          </a:bodyPr>
+          <a:lstStyle/>
+          <a:p>
+            <a:pPr marL="0" lvl="0" indent="0" algn="l" rtl="0">
+              <a:lnSpc>
+                <a:spcPct val="100000"/>
+              </a:lnSpc>
+              <a:spcBef>
+                <a:spcPts val="0"/>
+              </a:spcBef>
+              <a:spcAft>
+                <a:spcPts val="0"/>
+              </a:spcAft>
+              <a:buClr>
+                <a:schemeClr val="dk1"/>
+              </a:buClr>
+              <a:buSzPts val="1100"/>
+              <a:buFont typeface="Arial"/>
+              <a:buNone/>
+            </a:pPr>
+            <a:r>
+              <a:rPr lang="en-US" b="1" smtClean="0">
+                <a:solidFill>
+                  <a:srgbClr val="5CC2A8"/>
+                </a:solidFill>
+                <a:latin typeface="Arial"/>
+                <a:ea typeface="Arial"/>
+                <a:cs typeface="Arial"/>
+                <a:sym typeface="Arial"/>
+              </a:rPr>
+              <a:t>Dự án</a:t>
+            </a:r>
+            <a:endParaRPr b="1">
+              <a:solidFill>
+                <a:srgbClr val="5CC2A8"/>
+              </a:solidFill>
+              <a:latin typeface="Arial"/>
+              <a:ea typeface="Arial"/>
+              <a:cs typeface="Arial"/>
+              <a:sym typeface="Arial"/>
+            </a:endParaRPr>
+          </a:p>
+          <a:p>
+            <a:pPr lvl="0">
+              <a:buClr>
+                <a:srgbClr val="15537E"/>
+              </a:buClr>
+            </a:pPr>
+            <a:r>
+              <a:rPr lang="en-US" sz="3000" smtClean="0">
+                <a:solidFill>
+                  <a:srgbClr val="15537E"/>
+                </a:solidFill>
+                <a:latin typeface="Arial"/>
+                <a:ea typeface="Arial"/>
+                <a:cs typeface="Arial"/>
+                <a:sym typeface="Arial"/>
+              </a:rPr>
+              <a:t/>
+            </a:r>
+            <a:br>
+              <a:rPr lang="en-US" sz="3000" smtClean="0">
+                <a:solidFill>
+                  <a:srgbClr val="15537E"/>
+                </a:solidFill>
+                <a:latin typeface="Arial"/>
+                <a:ea typeface="Arial"/>
+                <a:cs typeface="Arial"/>
+                <a:sym typeface="Arial"/>
+              </a:rPr>
+            </a:br>
+            <a:r>
+              <a:rPr lang="vi-VN" sz="3000" smtClean="0">
+                <a:solidFill>
+                  <a:srgbClr val="15537E"/>
+                </a:solidFill>
+                <a:latin typeface="Arial"/>
+                <a:ea typeface="Arial"/>
+                <a:cs typeface="Arial"/>
+                <a:sym typeface="Arial"/>
+              </a:rPr>
+              <a:t>Em </a:t>
+            </a:r>
+            <a:r>
+              <a:rPr lang="vi-VN" sz="3000">
+                <a:solidFill>
+                  <a:srgbClr val="15537E"/>
+                </a:solidFill>
+                <a:latin typeface="Arial"/>
+                <a:ea typeface="Arial"/>
+                <a:cs typeface="Arial"/>
+                <a:sym typeface="Arial"/>
+              </a:rPr>
+              <a:t>hãy viết chương trình chiếc nón kỳ diệu, yêu cầu tạo 2 file: </a:t>
+            </a:r>
+            <a:r>
+              <a:rPr lang="vi-VN" sz="3000" b="1">
+                <a:solidFill>
+                  <a:srgbClr val="15537E"/>
+                </a:solidFill>
+                <a:latin typeface="Arial"/>
+                <a:ea typeface="Arial"/>
+                <a:cs typeface="Arial"/>
+                <a:sym typeface="Arial"/>
+              </a:rPr>
+              <a:t>diem.py</a:t>
+            </a:r>
+            <a:r>
+              <a:rPr lang="vi-VN" sz="3000">
+                <a:solidFill>
+                  <a:srgbClr val="15537E"/>
+                </a:solidFill>
+                <a:latin typeface="Arial"/>
+                <a:ea typeface="Arial"/>
+                <a:cs typeface="Arial"/>
+                <a:sym typeface="Arial"/>
+              </a:rPr>
+              <a:t> và </a:t>
+            </a:r>
+            <a:r>
+              <a:rPr lang="vi-VN" sz="3000" b="1">
+                <a:solidFill>
+                  <a:srgbClr val="15537E"/>
+                </a:solidFill>
+                <a:latin typeface="Arial"/>
+                <a:ea typeface="Arial"/>
+                <a:cs typeface="Arial"/>
+                <a:sym typeface="Arial"/>
+              </a:rPr>
+              <a:t>my_main.py</a:t>
+            </a:r>
+            <a:r>
+              <a:rPr lang="vi-VN" sz="3000" smtClean="0">
+                <a:solidFill>
+                  <a:srgbClr val="15537E"/>
+                </a:solidFill>
+                <a:latin typeface="Arial"/>
+                <a:ea typeface="Arial"/>
+                <a:cs typeface="Arial"/>
+                <a:sym typeface="Arial"/>
+              </a:rPr>
+              <a:t>.</a:t>
+            </a:r>
+            <a:r>
+              <a:rPr lang="en-US" sz="3000" smtClean="0">
+                <a:solidFill>
+                  <a:srgbClr val="15537E"/>
+                </a:solidFill>
+                <a:latin typeface="Arial"/>
+                <a:ea typeface="Arial"/>
+                <a:cs typeface="Arial"/>
+                <a:sym typeface="Arial"/>
+              </a:rPr>
+              <a:t/>
+            </a:r>
+            <a:br>
+              <a:rPr lang="en-US" sz="3000" smtClean="0">
+                <a:solidFill>
+                  <a:srgbClr val="15537E"/>
+                </a:solidFill>
+                <a:latin typeface="Arial"/>
+                <a:ea typeface="Arial"/>
+                <a:cs typeface="Arial"/>
+                <a:sym typeface="Arial"/>
+              </a:rPr>
+            </a:br>
+            <a:r>
+              <a:rPr lang="vi-VN" sz="3000">
+                <a:solidFill>
+                  <a:srgbClr val="15537E"/>
+                </a:solidFill>
+                <a:latin typeface="Arial"/>
+                <a:ea typeface="Arial"/>
+                <a:cs typeface="Arial"/>
+                <a:sym typeface="Arial"/>
+              </a:rPr>
+              <a:t>1. Module: </a:t>
+            </a:r>
+            <a:r>
+              <a:rPr lang="vi-VN" sz="3000" b="1">
+                <a:solidFill>
+                  <a:srgbClr val="15537E"/>
+                </a:solidFill>
+                <a:latin typeface="Arial"/>
+                <a:ea typeface="Arial"/>
+                <a:cs typeface="Arial"/>
+                <a:sym typeface="Arial"/>
+              </a:rPr>
+              <a:t>diem.py</a:t>
+            </a:r>
+            <a:r>
+              <a:rPr lang="vi-VN" sz="3000">
+                <a:solidFill>
+                  <a:srgbClr val="15537E"/>
+                </a:solidFill>
+                <a:latin typeface="Arial"/>
+                <a:ea typeface="Arial"/>
+                <a:cs typeface="Arial"/>
+                <a:sym typeface="Arial"/>
+              </a:rPr>
+              <a:t>, trong module này chứa các hàm điểm mà người chơi </a:t>
+            </a:r>
+            <a:r>
+              <a:rPr lang="vi-VN" sz="3000">
+                <a:solidFill>
+                  <a:srgbClr val="15537E"/>
+                </a:solidFill>
+                <a:latin typeface="Arial"/>
+                <a:ea typeface="Arial"/>
+                <a:cs typeface="Arial"/>
+                <a:sym typeface="Arial"/>
+              </a:rPr>
+              <a:t>quay </a:t>
+            </a:r>
+            <a:r>
+              <a:rPr lang="vi-VN" sz="3000" smtClean="0">
+                <a:solidFill>
+                  <a:srgbClr val="15537E"/>
+                </a:solidFill>
+                <a:latin typeface="Arial"/>
+                <a:ea typeface="Arial"/>
+                <a:cs typeface="Arial"/>
+                <a:sym typeface="Arial"/>
+              </a:rPr>
+              <a:t>được</a:t>
+            </a:r>
+            <a:r>
+              <a:rPr lang="en-US" sz="3000" smtClean="0">
+                <a:solidFill>
+                  <a:srgbClr val="15537E"/>
+                </a:solidFill>
+                <a:latin typeface="Arial"/>
+                <a:ea typeface="Arial"/>
+                <a:cs typeface="Arial"/>
+                <a:sym typeface="Arial"/>
+              </a:rPr>
+              <a:t>.</a:t>
+            </a:r>
+            <a:br>
+              <a:rPr lang="en-US" sz="3000" smtClean="0">
+                <a:solidFill>
+                  <a:srgbClr val="15537E"/>
+                </a:solidFill>
+                <a:latin typeface="Arial"/>
+                <a:ea typeface="Arial"/>
+                <a:cs typeface="Arial"/>
+                <a:sym typeface="Arial"/>
+              </a:rPr>
+            </a:br>
+            <a:r>
+              <a:rPr lang="vi-VN" sz="3000">
+                <a:solidFill>
+                  <a:srgbClr val="15537E"/>
+                </a:solidFill>
+                <a:latin typeface="Arial"/>
+                <a:ea typeface="Arial"/>
+                <a:cs typeface="Arial"/>
+                <a:sym typeface="Arial"/>
+              </a:rPr>
+              <a:t>2. Trong file chương trình: </a:t>
+            </a:r>
+            <a:r>
+              <a:rPr lang="vi-VN" sz="3000" b="1">
+                <a:solidFill>
+                  <a:srgbClr val="15537E"/>
+                </a:solidFill>
+                <a:latin typeface="Arial"/>
+                <a:ea typeface="Arial"/>
+                <a:cs typeface="Arial"/>
+                <a:sym typeface="Arial"/>
+              </a:rPr>
+              <a:t>my_main.py</a:t>
+            </a:r>
+            <a:r>
+              <a:rPr lang="vi-VN" sz="3000">
+                <a:solidFill>
+                  <a:srgbClr val="15537E"/>
+                </a:solidFill>
+                <a:latin typeface="Arial"/>
+                <a:ea typeface="Arial"/>
+                <a:cs typeface="Arial"/>
+                <a:sym typeface="Arial"/>
+              </a:rPr>
+              <a:t> </a:t>
+            </a:r>
+            <a:r>
+              <a:rPr lang="vi-VN" sz="3000" smtClean="0">
+                <a:solidFill>
+                  <a:srgbClr val="15537E"/>
+                </a:solidFill>
+                <a:latin typeface="Arial"/>
+                <a:ea typeface="Arial"/>
+                <a:cs typeface="Arial"/>
+                <a:sym typeface="Arial"/>
+              </a:rPr>
+              <a:t>sẽ </a:t>
+            </a:r>
+            <a:r>
+              <a:rPr lang="vi-VN" sz="3000">
+                <a:solidFill>
+                  <a:srgbClr val="15537E"/>
+                </a:solidFill>
+                <a:latin typeface="Arial"/>
+                <a:ea typeface="Arial"/>
+                <a:cs typeface="Arial"/>
+                <a:sym typeface="Arial"/>
+              </a:rPr>
+              <a:t>import </a:t>
+            </a:r>
+            <a:r>
+              <a:rPr lang="vi-VN" sz="3000" b="1">
+                <a:solidFill>
+                  <a:srgbClr val="15537E"/>
+                </a:solidFill>
+                <a:latin typeface="Arial"/>
+                <a:ea typeface="Arial"/>
+                <a:cs typeface="Arial"/>
+                <a:sym typeface="Arial"/>
+              </a:rPr>
+              <a:t>diem.py;</a:t>
+            </a:r>
+            <a:r>
+              <a:rPr lang="vi-VN" sz="3000">
+                <a:solidFill>
+                  <a:srgbClr val="15537E"/>
+                </a:solidFill>
+                <a:latin typeface="Arial"/>
+                <a:ea typeface="Arial"/>
+                <a:cs typeface="Arial"/>
+                <a:sym typeface="Arial"/>
+              </a:rPr>
+              <a:t> trước khi đưa câu hỏi trắc nghiệm, người chơi phải quay điểm; sau đó, cho người chơi sẽ phải trả lời câu hỏi trắc nghiệm. Nếu trả lời đúng tính điểm, trả lời sai không tính điểm. Mỗi người chơi sẽ phải trả lời 3 câu trắc nghiệm</a:t>
+            </a:r>
+            <a:r>
+              <a:rPr lang="vi-VN" sz="3000">
+                <a:solidFill>
+                  <a:srgbClr val="15537E"/>
+                </a:solidFill>
+                <a:latin typeface="Arial"/>
+                <a:ea typeface="Arial"/>
+                <a:cs typeface="Arial"/>
+                <a:sym typeface="Arial"/>
+              </a:rPr>
+              <a:t>. </a:t>
+            </a:r>
+            <a:r>
+              <a:rPr lang="en-US" sz="3000" smtClean="0">
+                <a:solidFill>
+                  <a:srgbClr val="15537E"/>
+                </a:solidFill>
+                <a:latin typeface="Arial"/>
+                <a:ea typeface="Arial"/>
+                <a:cs typeface="Arial"/>
+                <a:sym typeface="Arial"/>
+              </a:rPr>
+              <a:t>K</a:t>
+            </a:r>
+            <a:r>
+              <a:rPr lang="vi-VN" sz="3000" smtClean="0">
+                <a:solidFill>
+                  <a:srgbClr val="15537E"/>
+                </a:solidFill>
+                <a:latin typeface="Arial"/>
+                <a:ea typeface="Arial"/>
+                <a:cs typeface="Arial"/>
+                <a:sym typeface="Arial"/>
+              </a:rPr>
+              <a:t>ết </a:t>
+            </a:r>
+            <a:r>
+              <a:rPr lang="vi-VN" sz="3000">
+                <a:solidFill>
+                  <a:srgbClr val="15537E"/>
+                </a:solidFill>
+                <a:latin typeface="Arial"/>
+                <a:ea typeface="Arial"/>
+                <a:cs typeface="Arial"/>
+                <a:sym typeface="Arial"/>
+              </a:rPr>
+              <a:t>thúc đưa ra tổng điểm mà người chơi đạt được.</a:t>
+            </a:r>
+            <a:r>
+              <a:rPr lang="en-US" sz="4000" smtClean="0">
+                <a:solidFill>
+                  <a:srgbClr val="15537E"/>
+                </a:solidFill>
+                <a:latin typeface="Arial"/>
+                <a:ea typeface="Arial"/>
+                <a:cs typeface="Arial"/>
+                <a:sym typeface="Arial"/>
+              </a:rPr>
+              <a:t/>
+            </a:r>
+            <a:br>
+              <a:rPr lang="en-US" sz="4000" smtClean="0">
+                <a:solidFill>
+                  <a:srgbClr val="15537E"/>
+                </a:solidFill>
+                <a:latin typeface="Arial"/>
+                <a:ea typeface="Arial"/>
+                <a:cs typeface="Arial"/>
+                <a:sym typeface="Arial"/>
+              </a:rPr>
+            </a:br>
+            <a:endParaRPr sz="4000">
+              <a:solidFill>
+                <a:srgbClr val="157359"/>
+              </a:solidFill>
+            </a:endParaRPr>
+          </a:p>
+        </p:txBody>
+      </p:sp>
+      <p:grpSp>
+        <p:nvGrpSpPr>
+          <p:cNvPr id="321" name="Google Shape;321;p41"/>
+          <p:cNvGrpSpPr/>
+          <p:nvPr/>
+        </p:nvGrpSpPr>
+        <p:grpSpPr>
+          <a:xfrm>
+            <a:off x="498103" y="93784"/>
+            <a:ext cx="11423100" cy="710181"/>
+            <a:chOff x="-129" y="0"/>
+            <a:chExt cx="11423100" cy="710181"/>
+          </a:xfrm>
+        </p:grpSpPr>
+        <p:pic>
+          <p:nvPicPr>
+            <p:cNvPr id="322" name="Google Shape;322;p41"/>
+            <p:cNvPicPr preferRelativeResize="0"/>
+            <p:nvPr/>
+          </p:nvPicPr>
+          <p:blipFill rotWithShape="1">
+            <a:blip r:embed="rId3">
+              <a:alphaModFix/>
+            </a:blip>
+            <a:srcRect/>
+            <a:stretch/>
+          </p:blipFill>
+          <p:spPr>
+            <a:xfrm>
+              <a:off x="9747737" y="0"/>
+              <a:ext cx="1675234" cy="575196"/>
+            </a:xfrm>
+            <a:prstGeom prst="rect">
+              <a:avLst/>
+            </a:prstGeom>
+            <a:noFill/>
+            <a:ln>
+              <a:noFill/>
+            </a:ln>
+          </p:spPr>
+        </p:pic>
+        <p:cxnSp>
+          <p:nvCxnSpPr>
+            <p:cNvPr id="323" name="Google Shape;323;p41"/>
+            <p:cNvCxnSpPr/>
+            <p:nvPr/>
+          </p:nvCxnSpPr>
+          <p:spPr>
+            <a:xfrm rot="10800000">
+              <a:off x="-129" y="710181"/>
+              <a:ext cx="11423100" cy="0"/>
+            </a:xfrm>
+            <a:prstGeom prst="straightConnector1">
+              <a:avLst/>
+            </a:prstGeom>
+            <a:noFill/>
+            <a:ln w="9525" cap="flat" cmpd="sng">
+              <a:solidFill>
+                <a:srgbClr val="AAE2D3"/>
+              </a:solidFill>
+              <a:prstDash val="solid"/>
+              <a:miter lim="800000"/>
+              <a:headEnd type="none" w="sm" len="sm"/>
+              <a:tailEnd type="none" w="sm" len="sm"/>
+            </a:ln>
+          </p:spPr>
+        </p:cxnSp>
+      </p:grpSp>
+      <p:pic>
+        <p:nvPicPr>
+          <p:cNvPr id="5" name="Picture 4"/>
+          <p:cNvPicPr>
+            <a:picLocks noChangeAspect="1"/>
+          </p:cNvPicPr>
+          <p:nvPr/>
+        </p:nvPicPr>
+        <p:blipFill>
+          <a:blip r:embed="rId4">
+            <a:extLst>
+              <a:ext uri="{28A0092B-C50C-407E-A947-70E740481C1C}">
+                <a14:useLocalDpi xmlns:a14="http://schemas.microsoft.com/office/drawing/2010/main" val="0"/>
+              </a:ext>
+            </a:extLst>
+          </a:blip>
+          <a:stretch>
+            <a:fillRect/>
+          </a:stretch>
+        </p:blipFill>
+        <p:spPr>
+          <a:xfrm>
+            <a:off x="10245969" y="2532698"/>
+            <a:ext cx="1675234" cy="3971290"/>
+          </a:xfrm>
+          <a:prstGeom prst="rect">
+            <a:avLst/>
+          </a:prstGeom>
+        </p:spPr>
+      </p:pic>
+    </p:spTree>
+    <p:extLst>
+      <p:ext uri="{BB962C8B-B14F-4D97-AF65-F5344CB8AC3E}">
+        <p14:creationId xmlns:p14="http://schemas.microsoft.com/office/powerpoint/2010/main" val="3568173209"/>
+      </p:ext>
+    </p:extLst>
+  </p:cSld>
+  <p:clrMapOvr>
+    <a:masterClrMapping/>
+  </p:clrMapOvr>
+  <p:timing>
+    <p:tnLst>
+      <p:par>
+        <p:cTn id="1" dur="indefinite" restart="never" nodeType="tmRoot">
+          <p:childTnLst>
+            <p:seq concurrent="1" nextAc="seek">
+              <p:cTn id="2" dur="indefinite" nodeType="mainSeq">
+                <p:childTnLst>
+                  <p:par>
+                    <p:cTn id="3" fill="hold">
+                      <p:stCondLst>
+                        <p:cond delay="indefinite"/>
+                      </p:stCondLst>
+                      <p:childTnLst>
+                        <p:par>
+                          <p:cTn id="4" fill="hold">
+                            <p:stCondLst>
+                              <p:cond delay="0"/>
+                            </p:stCondLst>
+                            <p:childTnLst>
+                              <p:par>
+                                <p:cTn id="5" presetID="42" presetClass="entr" presetSubtype="0" fill="hold" grpId="0" nodeType="clickEffect">
+                                  <p:stCondLst>
+                                    <p:cond delay="0"/>
+                                  </p:stCondLst>
+                                  <p:childTnLst>
+                                    <p:set>
+                                      <p:cBhvr>
+                                        <p:cTn id="6" dur="1" fill="hold">
+                                          <p:stCondLst>
+                                            <p:cond delay="0"/>
+                                          </p:stCondLst>
+                                        </p:cTn>
+                                        <p:tgtEl>
+                                          <p:spTgt spid="320"/>
+                                        </p:tgtEl>
+                                        <p:attrNameLst>
+                                          <p:attrName>style.visibility</p:attrName>
+                                        </p:attrNameLst>
+                                      </p:cBhvr>
+                                      <p:to>
+                                        <p:strVal val="visible"/>
+                                      </p:to>
+                                    </p:set>
+                                    <p:animEffect transition="in" filter="fade">
+                                      <p:cBhvr>
+                                        <p:cTn id="7" dur="1000"/>
+                                        <p:tgtEl>
+                                          <p:spTgt spid="320"/>
+                                        </p:tgtEl>
+                                      </p:cBhvr>
+                                    </p:animEffect>
+                                    <p:anim calcmode="lin" valueType="num">
+                                      <p:cBhvr>
+                                        <p:cTn id="8" dur="1000" fill="hold"/>
+                                        <p:tgtEl>
+                                          <p:spTgt spid="320"/>
+                                        </p:tgtEl>
+                                        <p:attrNameLst>
+                                          <p:attrName>ppt_x</p:attrName>
+                                        </p:attrNameLst>
+                                      </p:cBhvr>
+                                      <p:tavLst>
+                                        <p:tav tm="0">
+                                          <p:val>
+                                            <p:strVal val="#ppt_x"/>
+                                          </p:val>
+                                        </p:tav>
+                                        <p:tav tm="100000">
+                                          <p:val>
+                                            <p:strVal val="#ppt_x"/>
+                                          </p:val>
+                                        </p:tav>
+                                      </p:tavLst>
+                                    </p:anim>
+                                    <p:anim calcmode="lin" valueType="num">
+                                      <p:cBhvr>
+                                        <p:cTn id="9" dur="1000" fill="hold"/>
+                                        <p:tgtEl>
+                                          <p:spTgt spid="320"/>
+                                        </p:tgtEl>
+                                        <p:attrNameLst>
+                                          <p:attrName>ppt_y</p:attrName>
+                                        </p:attrNameLst>
+                                      </p:cBhvr>
+                                      <p:tavLst>
+                                        <p:tav tm="0">
+                                          <p:val>
+                                            <p:strVal val="#ppt_y+.1"/>
+                                          </p:val>
+                                        </p:tav>
+                                        <p:tav tm="100000">
+                                          <p:val>
+                                            <p:strVal val="#ppt_y"/>
+                                          </p:val>
+                                        </p:tav>
+                                      </p:tavLst>
+                                    </p:anim>
+                                  </p:childTnLst>
+                                </p:cTn>
+                              </p:par>
+                            </p:childTnLst>
+                          </p:cTn>
+                        </p:par>
+                      </p:childTnLst>
+                    </p:cTn>
+                  </p:par>
+                </p:childTnLst>
+              </p:cTn>
+              <p:prevCondLst>
+                <p:cond evt="onPrev" delay="0">
+                  <p:tgtEl>
+                    <p:sldTgt/>
+                  </p:tgtEl>
+                </p:cond>
+              </p:prevCondLst>
+              <p:nextCondLst>
+                <p:cond evt="onNext" delay="0">
+                  <p:tgtEl>
+                    <p:sldTgt/>
+                  </p:tgtEl>
+                </p:cond>
+              </p:nextCondLst>
+            </p:seq>
+          </p:childTnLst>
+        </p:cTn>
+      </p:par>
+    </p:tnLst>
+    <p:bldLst>
+      <p:bldP spid="320" grpId="0"/>
+    </p:bldLst>
+  </p:timing>
+</p:sld>
+</file>
+
+<file path=ppt/slides/slide15.xml><?xml version="1.0" encoding="utf-8"?>
 <p:sld xmlns:a="http://schemas.openxmlformats.org/drawingml/2006/main" xmlns:r="http://schemas.openxmlformats.org/officeDocument/2006/relationships" xmlns:p="http://schemas.openxmlformats.org/presentationml/2006/main">
   <p:cSld>
     <p:spTree>
@@ -18819,6 +21088,13 @@
   <p:clrMapOvr>
     <a:masterClrMapping/>
   </p:clrMapOvr>
+  <p:timing>
+    <p:tnLst>
+      <p:par>
+        <p:cTn id="1" dur="indefinite" restart="never" nodeType="tmRoot"/>
+      </p:par>
+    </p:tnLst>
+  </p:timing>
 </p:sld>
 </file>
 
@@ -19505,6 +21781,13 @@
   <p:clrMapOvr>
     <a:masterClrMapping/>
   </p:clrMapOvr>
+  <p:timing>
+    <p:tnLst>
+      <p:par>
+        <p:cTn id="1" dur="indefinite" restart="never" nodeType="tmRoot"/>
+      </p:par>
+    </p:tnLst>
+  </p:timing>
 </p:sld>
 </file>
 
@@ -19763,6 +22046,333 @@
   <p:clrMapOvr>
     <a:masterClrMapping/>
   </p:clrMapOvr>
+  <p:timing>
+    <p:tnLst>
+      <p:par>
+        <p:cTn id="1" dur="indefinite" restart="never" nodeType="tmRoot">
+          <p:childTnLst>
+            <p:seq concurrent="1" nextAc="seek">
+              <p:cTn id="2" dur="indefinite" nodeType="mainSeq">
+                <p:childTnLst>
+                  <p:par>
+                    <p:cTn id="3" fill="hold">
+                      <p:stCondLst>
+                        <p:cond delay="indefinite"/>
+                      </p:stCondLst>
+                      <p:childTnLst>
+                        <p:par>
+                          <p:cTn id="4" fill="hold">
+                            <p:stCondLst>
+                              <p:cond delay="0"/>
+                            </p:stCondLst>
+                            <p:childTnLst>
+                              <p:par>
+                                <p:cTn id="5" presetID="42" presetClass="entr" presetSubtype="0" fill="hold" nodeType="clickEffect">
+                                  <p:stCondLst>
+                                    <p:cond delay="0"/>
+                                  </p:stCondLst>
+                                  <p:childTnLst>
+                                    <p:set>
+                                      <p:cBhvr>
+                                        <p:cTn id="6" dur="1" fill="hold">
+                                          <p:stCondLst>
+                                            <p:cond delay="0"/>
+                                          </p:stCondLst>
+                                        </p:cTn>
+                                        <p:tgtEl>
+                                          <p:spTgt spid="2"/>
+                                        </p:tgtEl>
+                                        <p:attrNameLst>
+                                          <p:attrName>style.visibility</p:attrName>
+                                        </p:attrNameLst>
+                                      </p:cBhvr>
+                                      <p:to>
+                                        <p:strVal val="visible"/>
+                                      </p:to>
+                                    </p:set>
+                                    <p:animEffect transition="in" filter="fade">
+                                      <p:cBhvr>
+                                        <p:cTn id="7" dur="1000"/>
+                                        <p:tgtEl>
+                                          <p:spTgt spid="2"/>
+                                        </p:tgtEl>
+                                      </p:cBhvr>
+                                    </p:animEffect>
+                                    <p:anim calcmode="lin" valueType="num">
+                                      <p:cBhvr>
+                                        <p:cTn id="8" dur="1000" fill="hold"/>
+                                        <p:tgtEl>
+                                          <p:spTgt spid="2"/>
+                                        </p:tgtEl>
+                                        <p:attrNameLst>
+                                          <p:attrName>ppt_x</p:attrName>
+                                        </p:attrNameLst>
+                                      </p:cBhvr>
+                                      <p:tavLst>
+                                        <p:tav tm="0">
+                                          <p:val>
+                                            <p:strVal val="#ppt_x"/>
+                                          </p:val>
+                                        </p:tav>
+                                        <p:tav tm="100000">
+                                          <p:val>
+                                            <p:strVal val="#ppt_x"/>
+                                          </p:val>
+                                        </p:tav>
+                                      </p:tavLst>
+                                    </p:anim>
+                                    <p:anim calcmode="lin" valueType="num">
+                                      <p:cBhvr>
+                                        <p:cTn id="9" dur="1000" fill="hold"/>
+                                        <p:tgtEl>
+                                          <p:spTgt spid="2"/>
+                                        </p:tgtEl>
+                                        <p:attrNameLst>
+                                          <p:attrName>ppt_y</p:attrName>
+                                        </p:attrNameLst>
+                                      </p:cBhvr>
+                                      <p:tavLst>
+                                        <p:tav tm="0">
+                                          <p:val>
+                                            <p:strVal val="#ppt_y+.1"/>
+                                          </p:val>
+                                        </p:tav>
+                                        <p:tav tm="100000">
+                                          <p:val>
+                                            <p:strVal val="#ppt_y"/>
+                                          </p:val>
+                                        </p:tav>
+                                      </p:tavLst>
+                                    </p:anim>
+                                  </p:childTnLst>
+                                </p:cTn>
+                              </p:par>
+                            </p:childTnLst>
+                          </p:cTn>
+                        </p:par>
+                      </p:childTnLst>
+                    </p:cTn>
+                  </p:par>
+                  <p:par>
+                    <p:cTn id="10" fill="hold">
+                      <p:stCondLst>
+                        <p:cond delay="indefinite"/>
+                      </p:stCondLst>
+                      <p:childTnLst>
+                        <p:par>
+                          <p:cTn id="11" fill="hold">
+                            <p:stCondLst>
+                              <p:cond delay="0"/>
+                            </p:stCondLst>
+                            <p:childTnLst>
+                              <p:par>
+                                <p:cTn id="12" presetID="42" presetClass="entr" presetSubtype="0" fill="hold" nodeType="clickEffect">
+                                  <p:stCondLst>
+                                    <p:cond delay="0"/>
+                                  </p:stCondLst>
+                                  <p:childTnLst>
+                                    <p:set>
+                                      <p:cBhvr>
+                                        <p:cTn id="13" dur="1" fill="hold">
+                                          <p:stCondLst>
+                                            <p:cond delay="0"/>
+                                          </p:stCondLst>
+                                        </p:cTn>
+                                        <p:tgtEl>
+                                          <p:spTgt spid="3"/>
+                                        </p:tgtEl>
+                                        <p:attrNameLst>
+                                          <p:attrName>style.visibility</p:attrName>
+                                        </p:attrNameLst>
+                                      </p:cBhvr>
+                                      <p:to>
+                                        <p:strVal val="visible"/>
+                                      </p:to>
+                                    </p:set>
+                                    <p:animEffect transition="in" filter="fade">
+                                      <p:cBhvr>
+                                        <p:cTn id="14" dur="1000"/>
+                                        <p:tgtEl>
+                                          <p:spTgt spid="3"/>
+                                        </p:tgtEl>
+                                      </p:cBhvr>
+                                    </p:animEffect>
+                                    <p:anim calcmode="lin" valueType="num">
+                                      <p:cBhvr>
+                                        <p:cTn id="15" dur="1000" fill="hold"/>
+                                        <p:tgtEl>
+                                          <p:spTgt spid="3"/>
+                                        </p:tgtEl>
+                                        <p:attrNameLst>
+                                          <p:attrName>ppt_x</p:attrName>
+                                        </p:attrNameLst>
+                                      </p:cBhvr>
+                                      <p:tavLst>
+                                        <p:tav tm="0">
+                                          <p:val>
+                                            <p:strVal val="#ppt_x"/>
+                                          </p:val>
+                                        </p:tav>
+                                        <p:tav tm="100000">
+                                          <p:val>
+                                            <p:strVal val="#ppt_x"/>
+                                          </p:val>
+                                        </p:tav>
+                                      </p:tavLst>
+                                    </p:anim>
+                                    <p:anim calcmode="lin" valueType="num">
+                                      <p:cBhvr>
+                                        <p:cTn id="16" dur="1000" fill="hold"/>
+                                        <p:tgtEl>
+                                          <p:spTgt spid="3"/>
+                                        </p:tgtEl>
+                                        <p:attrNameLst>
+                                          <p:attrName>ppt_y</p:attrName>
+                                        </p:attrNameLst>
+                                      </p:cBhvr>
+                                      <p:tavLst>
+                                        <p:tav tm="0">
+                                          <p:val>
+                                            <p:strVal val="#ppt_y+.1"/>
+                                          </p:val>
+                                        </p:tav>
+                                        <p:tav tm="100000">
+                                          <p:val>
+                                            <p:strVal val="#ppt_y"/>
+                                          </p:val>
+                                        </p:tav>
+                                      </p:tavLst>
+                                    </p:anim>
+                                  </p:childTnLst>
+                                </p:cTn>
+                              </p:par>
+                            </p:childTnLst>
+                          </p:cTn>
+                        </p:par>
+                      </p:childTnLst>
+                    </p:cTn>
+                  </p:par>
+                  <p:par>
+                    <p:cTn id="17" fill="hold">
+                      <p:stCondLst>
+                        <p:cond delay="indefinite"/>
+                      </p:stCondLst>
+                      <p:childTnLst>
+                        <p:par>
+                          <p:cTn id="18" fill="hold">
+                            <p:stCondLst>
+                              <p:cond delay="0"/>
+                            </p:stCondLst>
+                            <p:childTnLst>
+                              <p:par>
+                                <p:cTn id="19" presetID="42" presetClass="entr" presetSubtype="0" fill="hold" nodeType="clickEffect">
+                                  <p:stCondLst>
+                                    <p:cond delay="0"/>
+                                  </p:stCondLst>
+                                  <p:childTnLst>
+                                    <p:set>
+                                      <p:cBhvr>
+                                        <p:cTn id="20" dur="1" fill="hold">
+                                          <p:stCondLst>
+                                            <p:cond delay="0"/>
+                                          </p:stCondLst>
+                                        </p:cTn>
+                                        <p:tgtEl>
+                                          <p:spTgt spid="13"/>
+                                        </p:tgtEl>
+                                        <p:attrNameLst>
+                                          <p:attrName>style.visibility</p:attrName>
+                                        </p:attrNameLst>
+                                      </p:cBhvr>
+                                      <p:to>
+                                        <p:strVal val="visible"/>
+                                      </p:to>
+                                    </p:set>
+                                    <p:animEffect transition="in" filter="fade">
+                                      <p:cBhvr>
+                                        <p:cTn id="21" dur="1000"/>
+                                        <p:tgtEl>
+                                          <p:spTgt spid="13"/>
+                                        </p:tgtEl>
+                                      </p:cBhvr>
+                                    </p:animEffect>
+                                    <p:anim calcmode="lin" valueType="num">
+                                      <p:cBhvr>
+                                        <p:cTn id="22" dur="1000" fill="hold"/>
+                                        <p:tgtEl>
+                                          <p:spTgt spid="13"/>
+                                        </p:tgtEl>
+                                        <p:attrNameLst>
+                                          <p:attrName>ppt_x</p:attrName>
+                                        </p:attrNameLst>
+                                      </p:cBhvr>
+                                      <p:tavLst>
+                                        <p:tav tm="0">
+                                          <p:val>
+                                            <p:strVal val="#ppt_x"/>
+                                          </p:val>
+                                        </p:tav>
+                                        <p:tav tm="100000">
+                                          <p:val>
+                                            <p:strVal val="#ppt_x"/>
+                                          </p:val>
+                                        </p:tav>
+                                      </p:tavLst>
+                                    </p:anim>
+                                    <p:anim calcmode="lin" valueType="num">
+                                      <p:cBhvr>
+                                        <p:cTn id="23" dur="1000" fill="hold"/>
+                                        <p:tgtEl>
+                                          <p:spTgt spid="13"/>
+                                        </p:tgtEl>
+                                        <p:attrNameLst>
+                                          <p:attrName>ppt_y</p:attrName>
+                                        </p:attrNameLst>
+                                      </p:cBhvr>
+                                      <p:tavLst>
+                                        <p:tav tm="0">
+                                          <p:val>
+                                            <p:strVal val="#ppt_y+.1"/>
+                                          </p:val>
+                                        </p:tav>
+                                        <p:tav tm="100000">
+                                          <p:val>
+                                            <p:strVal val="#ppt_y"/>
+                                          </p:val>
+                                        </p:tav>
+                                      </p:tavLst>
+                                    </p:anim>
+                                  </p:childTnLst>
+                                </p:cTn>
+                              </p:par>
+                            </p:childTnLst>
+                          </p:cTn>
+                        </p:par>
+                      </p:childTnLst>
+                    </p:cTn>
+                  </p:par>
+                </p:childTnLst>
+              </p:cTn>
+              <p:prevCondLst>
+                <p:cond evt="onPrev" delay="0">
+                  <p:tgtEl>
+                    <p:sldTgt/>
+                  </p:tgtEl>
+                </p:cond>
+              </p:prevCondLst>
+              <p:nextCondLst>
+                <p:cond evt="onNext" delay="0">
+                  <p:tgtEl>
+                    <p:sldTgt/>
+                  </p:tgtEl>
+                </p:cond>
+              </p:nextCondLst>
+            </p:seq>
+          </p:childTnLst>
+        </p:cTn>
+      </p:par>
+    </p:tnLst>
+  </p:timing>
 </p:sld>
 </file>
 
@@ -19991,6 +22601,216 @@
   <p:clrMapOvr>
     <a:masterClrMapping/>
   </p:clrMapOvr>
+  <p:timing>
+    <p:tnLst>
+      <p:par>
+        <p:cTn id="1" dur="indefinite" restart="never" nodeType="tmRoot">
+          <p:childTnLst>
+            <p:seq concurrent="1" nextAc="seek">
+              <p:cTn id="2" dur="indefinite" nodeType="mainSeq">
+                <p:childTnLst>
+                  <p:par>
+                    <p:cTn id="3" fill="hold">
+                      <p:stCondLst>
+                        <p:cond delay="indefinite"/>
+                      </p:stCondLst>
+                      <p:childTnLst>
+                        <p:par>
+                          <p:cTn id="4" fill="hold">
+                            <p:stCondLst>
+                              <p:cond delay="0"/>
+                            </p:stCondLst>
+                            <p:childTnLst>
+                              <p:par>
+                                <p:cTn id="5" presetID="42" presetClass="entr" presetSubtype="0" fill="hold" nodeType="clickEffect">
+                                  <p:stCondLst>
+                                    <p:cond delay="0"/>
+                                  </p:stCondLst>
+                                  <p:childTnLst>
+                                    <p:set>
+                                      <p:cBhvr>
+                                        <p:cTn id="6" dur="1" fill="hold">
+                                          <p:stCondLst>
+                                            <p:cond delay="0"/>
+                                          </p:stCondLst>
+                                        </p:cTn>
+                                        <p:tgtEl>
+                                          <p:spTgt spid="4"/>
+                                        </p:tgtEl>
+                                        <p:attrNameLst>
+                                          <p:attrName>style.visibility</p:attrName>
+                                        </p:attrNameLst>
+                                      </p:cBhvr>
+                                      <p:to>
+                                        <p:strVal val="visible"/>
+                                      </p:to>
+                                    </p:set>
+                                    <p:animEffect transition="in" filter="fade">
+                                      <p:cBhvr>
+                                        <p:cTn id="7" dur="1000"/>
+                                        <p:tgtEl>
+                                          <p:spTgt spid="4"/>
+                                        </p:tgtEl>
+                                      </p:cBhvr>
+                                    </p:animEffect>
+                                    <p:anim calcmode="lin" valueType="num">
+                                      <p:cBhvr>
+                                        <p:cTn id="8" dur="1000" fill="hold"/>
+                                        <p:tgtEl>
+                                          <p:spTgt spid="4"/>
+                                        </p:tgtEl>
+                                        <p:attrNameLst>
+                                          <p:attrName>ppt_x</p:attrName>
+                                        </p:attrNameLst>
+                                      </p:cBhvr>
+                                      <p:tavLst>
+                                        <p:tav tm="0">
+                                          <p:val>
+                                            <p:strVal val="#ppt_x"/>
+                                          </p:val>
+                                        </p:tav>
+                                        <p:tav tm="100000">
+                                          <p:val>
+                                            <p:strVal val="#ppt_x"/>
+                                          </p:val>
+                                        </p:tav>
+                                      </p:tavLst>
+                                    </p:anim>
+                                    <p:anim calcmode="lin" valueType="num">
+                                      <p:cBhvr>
+                                        <p:cTn id="9" dur="1000" fill="hold"/>
+                                        <p:tgtEl>
+                                          <p:spTgt spid="4"/>
+                                        </p:tgtEl>
+                                        <p:attrNameLst>
+                                          <p:attrName>ppt_y</p:attrName>
+                                        </p:attrNameLst>
+                                      </p:cBhvr>
+                                      <p:tavLst>
+                                        <p:tav tm="0">
+                                          <p:val>
+                                            <p:strVal val="#ppt_y+.1"/>
+                                          </p:val>
+                                        </p:tav>
+                                        <p:tav tm="100000">
+                                          <p:val>
+                                            <p:strVal val="#ppt_y"/>
+                                          </p:val>
+                                        </p:tav>
+                                      </p:tavLst>
+                                    </p:anim>
+                                  </p:childTnLst>
+                                </p:cTn>
+                              </p:par>
+                              <p:par>
+                                <p:cTn id="10" presetID="42" presetClass="entr" presetSubtype="0" fill="hold" nodeType="withEffect">
+                                  <p:stCondLst>
+                                    <p:cond delay="0"/>
+                                  </p:stCondLst>
+                                  <p:childTnLst>
+                                    <p:set>
+                                      <p:cBhvr>
+                                        <p:cTn id="11" dur="1" fill="hold">
+                                          <p:stCondLst>
+                                            <p:cond delay="0"/>
+                                          </p:stCondLst>
+                                        </p:cTn>
+                                        <p:tgtEl>
+                                          <p:spTgt spid="7"/>
+                                        </p:tgtEl>
+                                        <p:attrNameLst>
+                                          <p:attrName>style.visibility</p:attrName>
+                                        </p:attrNameLst>
+                                      </p:cBhvr>
+                                      <p:to>
+                                        <p:strVal val="visible"/>
+                                      </p:to>
+                                    </p:set>
+                                    <p:animEffect transition="in" filter="fade">
+                                      <p:cBhvr>
+                                        <p:cTn id="12" dur="1000"/>
+                                        <p:tgtEl>
+                                          <p:spTgt spid="7"/>
+                                        </p:tgtEl>
+                                      </p:cBhvr>
+                                    </p:animEffect>
+                                    <p:anim calcmode="lin" valueType="num">
+                                      <p:cBhvr>
+                                        <p:cTn id="13" dur="1000" fill="hold"/>
+                                        <p:tgtEl>
+                                          <p:spTgt spid="7"/>
+                                        </p:tgtEl>
+                                        <p:attrNameLst>
+                                          <p:attrName>ppt_x</p:attrName>
+                                        </p:attrNameLst>
+                                      </p:cBhvr>
+                                      <p:tavLst>
+                                        <p:tav tm="0">
+                                          <p:val>
+                                            <p:strVal val="#ppt_x"/>
+                                          </p:val>
+                                        </p:tav>
+                                        <p:tav tm="100000">
+                                          <p:val>
+                                            <p:strVal val="#ppt_x"/>
+                                          </p:val>
+                                        </p:tav>
+                                      </p:tavLst>
+                                    </p:anim>
+                                    <p:anim calcmode="lin" valueType="num">
+                                      <p:cBhvr>
+                                        <p:cTn id="14" dur="1000" fill="hold"/>
+                                        <p:tgtEl>
+                                          <p:spTgt spid="7"/>
+                                        </p:tgtEl>
+                                        <p:attrNameLst>
+                                          <p:attrName>ppt_y</p:attrName>
+                                        </p:attrNameLst>
+                                      </p:cBhvr>
+                                      <p:tavLst>
+                                        <p:tav tm="0">
+                                          <p:val>
+                                            <p:strVal val="#ppt_y+.1"/>
+                                          </p:val>
+                                        </p:tav>
+                                        <p:tav tm="100000">
+                                          <p:val>
+                                            <p:strVal val="#ppt_y"/>
+                                          </p:val>
+                                        </p:tav>
+                                      </p:tavLst>
+                                    </p:anim>
+                                  </p:childTnLst>
+                                </p:cTn>
+                              </p:par>
+                            </p:childTnLst>
+                          </p:cTn>
+                        </p:par>
+                      </p:childTnLst>
+                    </p:cTn>
+                  </p:par>
+                </p:childTnLst>
+              </p:cTn>
+              <p:prevCondLst>
+                <p:cond evt="onPrev" delay="0">
+                  <p:tgtEl>
+                    <p:sldTgt/>
+                  </p:tgtEl>
+                </p:cond>
+              </p:prevCondLst>
+              <p:nextCondLst>
+                <p:cond evt="onNext" delay="0">
+                  <p:tgtEl>
+                    <p:sldTgt/>
+                  </p:tgtEl>
+                </p:cond>
+              </p:nextCondLst>
+            </p:seq>
+          </p:childTnLst>
+        </p:cTn>
+      </p:par>
+    </p:tnLst>
+  </p:timing>
 </p:sld>
 </file>
 
@@ -20448,6 +23268,575 @@
   <p:clrMapOvr>
     <a:masterClrMapping/>
   </p:clrMapOvr>
+  <p:timing>
+    <p:tnLst>
+      <p:par>
+        <p:cTn id="1" dur="indefinite" restart="never" nodeType="tmRoot">
+          <p:childTnLst>
+            <p:seq concurrent="1" nextAc="seek">
+              <p:cTn id="2" dur="indefinite" nodeType="mainSeq">
+                <p:childTnLst>
+                  <p:par>
+                    <p:cTn id="3" fill="hold">
+                      <p:stCondLst>
+                        <p:cond delay="indefinite"/>
+                      </p:stCondLst>
+                      <p:childTnLst>
+                        <p:par>
+                          <p:cTn id="4" fill="hold">
+                            <p:stCondLst>
+                              <p:cond delay="0"/>
+                            </p:stCondLst>
+                            <p:childTnLst>
+                              <p:par>
+                                <p:cTn id="5" presetID="42" presetClass="entr" presetSubtype="0" fill="hold" nodeType="clickEffect">
+                                  <p:stCondLst>
+                                    <p:cond delay="0"/>
+                                  </p:stCondLst>
+                                  <p:childTnLst>
+                                    <p:set>
+                                      <p:cBhvr>
+                                        <p:cTn id="6" dur="1" fill="hold">
+                                          <p:stCondLst>
+                                            <p:cond delay="0"/>
+                                          </p:stCondLst>
+                                        </p:cTn>
+                                        <p:tgtEl>
+                                          <p:spTgt spid="279">
+                                            <p:txEl>
+                                              <p:pRg st="0" end="0"/>
+                                            </p:txEl>
+                                          </p:spTgt>
+                                        </p:tgtEl>
+                                        <p:attrNameLst>
+                                          <p:attrName>style.visibility</p:attrName>
+                                        </p:attrNameLst>
+                                      </p:cBhvr>
+                                      <p:to>
+                                        <p:strVal val="visible"/>
+                                      </p:to>
+                                    </p:set>
+                                    <p:animEffect transition="in" filter="fade">
+                                      <p:cBhvr>
+                                        <p:cTn id="7" dur="1000"/>
+                                        <p:tgtEl>
+                                          <p:spTgt spid="279">
+                                            <p:txEl>
+                                              <p:pRg st="0" end="0"/>
+                                            </p:txEl>
+                                          </p:spTgt>
+                                        </p:tgtEl>
+                                      </p:cBhvr>
+                                    </p:animEffect>
+                                    <p:anim calcmode="lin" valueType="num">
+                                      <p:cBhvr>
+                                        <p:cTn id="8" dur="1000" fill="hold"/>
+                                        <p:tgtEl>
+                                          <p:spTgt spid="279">
+                                            <p:txEl>
+                                              <p:pRg st="0" end="0"/>
+                                            </p:txEl>
+                                          </p:spTgt>
+                                        </p:tgtEl>
+                                        <p:attrNameLst>
+                                          <p:attrName>ppt_x</p:attrName>
+                                        </p:attrNameLst>
+                                      </p:cBhvr>
+                                      <p:tavLst>
+                                        <p:tav tm="0">
+                                          <p:val>
+                                            <p:strVal val="#ppt_x"/>
+                                          </p:val>
+                                        </p:tav>
+                                        <p:tav tm="100000">
+                                          <p:val>
+                                            <p:strVal val="#ppt_x"/>
+                                          </p:val>
+                                        </p:tav>
+                                      </p:tavLst>
+                                    </p:anim>
+                                    <p:anim calcmode="lin" valueType="num">
+                                      <p:cBhvr>
+                                        <p:cTn id="9" dur="1000" fill="hold"/>
+                                        <p:tgtEl>
+                                          <p:spTgt spid="279">
+                                            <p:txEl>
+                                              <p:pRg st="0" end="0"/>
+                                            </p:txEl>
+                                          </p:spTgt>
+                                        </p:tgtEl>
+                                        <p:attrNameLst>
+                                          <p:attrName>ppt_y</p:attrName>
+                                        </p:attrNameLst>
+                                      </p:cBhvr>
+                                      <p:tavLst>
+                                        <p:tav tm="0">
+                                          <p:val>
+                                            <p:strVal val="#ppt_y+.1"/>
+                                          </p:val>
+                                        </p:tav>
+                                        <p:tav tm="100000">
+                                          <p:val>
+                                            <p:strVal val="#ppt_y"/>
+                                          </p:val>
+                                        </p:tav>
+                                      </p:tavLst>
+                                    </p:anim>
+                                  </p:childTnLst>
+                                </p:cTn>
+                              </p:par>
+                            </p:childTnLst>
+                          </p:cTn>
+                        </p:par>
+                      </p:childTnLst>
+                    </p:cTn>
+                  </p:par>
+                  <p:par>
+                    <p:cTn id="10" fill="hold">
+                      <p:stCondLst>
+                        <p:cond delay="indefinite"/>
+                      </p:stCondLst>
+                      <p:childTnLst>
+                        <p:par>
+                          <p:cTn id="11" fill="hold">
+                            <p:stCondLst>
+                              <p:cond delay="0"/>
+                            </p:stCondLst>
+                            <p:childTnLst>
+                              <p:par>
+                                <p:cTn id="12" presetID="42" presetClass="entr" presetSubtype="0" fill="hold" nodeType="clickEffect">
+                                  <p:stCondLst>
+                                    <p:cond delay="0"/>
+                                  </p:stCondLst>
+                                  <p:childTnLst>
+                                    <p:set>
+                                      <p:cBhvr>
+                                        <p:cTn id="13" dur="1" fill="hold">
+                                          <p:stCondLst>
+                                            <p:cond delay="0"/>
+                                          </p:stCondLst>
+                                        </p:cTn>
+                                        <p:tgtEl>
+                                          <p:spTgt spid="279">
+                                            <p:txEl>
+                                              <p:pRg st="2" end="2"/>
+                                            </p:txEl>
+                                          </p:spTgt>
+                                        </p:tgtEl>
+                                        <p:attrNameLst>
+                                          <p:attrName>style.visibility</p:attrName>
+                                        </p:attrNameLst>
+                                      </p:cBhvr>
+                                      <p:to>
+                                        <p:strVal val="visible"/>
+                                      </p:to>
+                                    </p:set>
+                                    <p:animEffect transition="in" filter="fade">
+                                      <p:cBhvr>
+                                        <p:cTn id="14" dur="1000"/>
+                                        <p:tgtEl>
+                                          <p:spTgt spid="279">
+                                            <p:txEl>
+                                              <p:pRg st="2" end="2"/>
+                                            </p:txEl>
+                                          </p:spTgt>
+                                        </p:tgtEl>
+                                      </p:cBhvr>
+                                    </p:animEffect>
+                                    <p:anim calcmode="lin" valueType="num">
+                                      <p:cBhvr>
+                                        <p:cTn id="15" dur="1000" fill="hold"/>
+                                        <p:tgtEl>
+                                          <p:spTgt spid="279">
+                                            <p:txEl>
+                                              <p:pRg st="2" end="2"/>
+                                            </p:txEl>
+                                          </p:spTgt>
+                                        </p:tgtEl>
+                                        <p:attrNameLst>
+                                          <p:attrName>ppt_x</p:attrName>
+                                        </p:attrNameLst>
+                                      </p:cBhvr>
+                                      <p:tavLst>
+                                        <p:tav tm="0">
+                                          <p:val>
+                                            <p:strVal val="#ppt_x"/>
+                                          </p:val>
+                                        </p:tav>
+                                        <p:tav tm="100000">
+                                          <p:val>
+                                            <p:strVal val="#ppt_x"/>
+                                          </p:val>
+                                        </p:tav>
+                                      </p:tavLst>
+                                    </p:anim>
+                                    <p:anim calcmode="lin" valueType="num">
+                                      <p:cBhvr>
+                                        <p:cTn id="16" dur="1000" fill="hold"/>
+                                        <p:tgtEl>
+                                          <p:spTgt spid="279">
+                                            <p:txEl>
+                                              <p:pRg st="2" end="2"/>
+                                            </p:txEl>
+                                          </p:spTgt>
+                                        </p:tgtEl>
+                                        <p:attrNameLst>
+                                          <p:attrName>ppt_y</p:attrName>
+                                        </p:attrNameLst>
+                                      </p:cBhvr>
+                                      <p:tavLst>
+                                        <p:tav tm="0">
+                                          <p:val>
+                                            <p:strVal val="#ppt_y+.1"/>
+                                          </p:val>
+                                        </p:tav>
+                                        <p:tav tm="100000">
+                                          <p:val>
+                                            <p:strVal val="#ppt_y"/>
+                                          </p:val>
+                                        </p:tav>
+                                      </p:tavLst>
+                                    </p:anim>
+                                  </p:childTnLst>
+                                </p:cTn>
+                              </p:par>
+                            </p:childTnLst>
+                          </p:cTn>
+                        </p:par>
+                      </p:childTnLst>
+                    </p:cTn>
+                  </p:par>
+                  <p:par>
+                    <p:cTn id="17" fill="hold">
+                      <p:stCondLst>
+                        <p:cond delay="indefinite"/>
+                      </p:stCondLst>
+                      <p:childTnLst>
+                        <p:par>
+                          <p:cTn id="18" fill="hold">
+                            <p:stCondLst>
+                              <p:cond delay="0"/>
+                            </p:stCondLst>
+                            <p:childTnLst>
+                              <p:par>
+                                <p:cTn id="19" presetID="42" presetClass="entr" presetSubtype="0" fill="hold" nodeType="clickEffect">
+                                  <p:stCondLst>
+                                    <p:cond delay="0"/>
+                                  </p:stCondLst>
+                                  <p:childTnLst>
+                                    <p:set>
+                                      <p:cBhvr>
+                                        <p:cTn id="20" dur="1" fill="hold">
+                                          <p:stCondLst>
+                                            <p:cond delay="0"/>
+                                          </p:stCondLst>
+                                        </p:cTn>
+                                        <p:tgtEl>
+                                          <p:spTgt spid="279">
+                                            <p:txEl>
+                                              <p:pRg st="4" end="4"/>
+                                            </p:txEl>
+                                          </p:spTgt>
+                                        </p:tgtEl>
+                                        <p:attrNameLst>
+                                          <p:attrName>style.visibility</p:attrName>
+                                        </p:attrNameLst>
+                                      </p:cBhvr>
+                                      <p:to>
+                                        <p:strVal val="visible"/>
+                                      </p:to>
+                                    </p:set>
+                                    <p:animEffect transition="in" filter="fade">
+                                      <p:cBhvr>
+                                        <p:cTn id="21" dur="1000"/>
+                                        <p:tgtEl>
+                                          <p:spTgt spid="279">
+                                            <p:txEl>
+                                              <p:pRg st="4" end="4"/>
+                                            </p:txEl>
+                                          </p:spTgt>
+                                        </p:tgtEl>
+                                      </p:cBhvr>
+                                    </p:animEffect>
+                                    <p:anim calcmode="lin" valueType="num">
+                                      <p:cBhvr>
+                                        <p:cTn id="22" dur="1000" fill="hold"/>
+                                        <p:tgtEl>
+                                          <p:spTgt spid="279">
+                                            <p:txEl>
+                                              <p:pRg st="4" end="4"/>
+                                            </p:txEl>
+                                          </p:spTgt>
+                                        </p:tgtEl>
+                                        <p:attrNameLst>
+                                          <p:attrName>ppt_x</p:attrName>
+                                        </p:attrNameLst>
+                                      </p:cBhvr>
+                                      <p:tavLst>
+                                        <p:tav tm="0">
+                                          <p:val>
+                                            <p:strVal val="#ppt_x"/>
+                                          </p:val>
+                                        </p:tav>
+                                        <p:tav tm="100000">
+                                          <p:val>
+                                            <p:strVal val="#ppt_x"/>
+                                          </p:val>
+                                        </p:tav>
+                                      </p:tavLst>
+                                    </p:anim>
+                                    <p:anim calcmode="lin" valueType="num">
+                                      <p:cBhvr>
+                                        <p:cTn id="23" dur="1000" fill="hold"/>
+                                        <p:tgtEl>
+                                          <p:spTgt spid="279">
+                                            <p:txEl>
+                                              <p:pRg st="4" end="4"/>
+                                            </p:txEl>
+                                          </p:spTgt>
+                                        </p:tgtEl>
+                                        <p:attrNameLst>
+                                          <p:attrName>ppt_y</p:attrName>
+                                        </p:attrNameLst>
+                                      </p:cBhvr>
+                                      <p:tavLst>
+                                        <p:tav tm="0">
+                                          <p:val>
+                                            <p:strVal val="#ppt_y+.1"/>
+                                          </p:val>
+                                        </p:tav>
+                                        <p:tav tm="100000">
+                                          <p:val>
+                                            <p:strVal val="#ppt_y"/>
+                                          </p:val>
+                                        </p:tav>
+                                      </p:tavLst>
+                                    </p:anim>
+                                  </p:childTnLst>
+                                </p:cTn>
+                              </p:par>
+                              <p:par>
+                                <p:cTn id="24" presetID="42" presetClass="entr" presetSubtype="0" fill="hold" nodeType="withEffect">
+                                  <p:stCondLst>
+                                    <p:cond delay="0"/>
+                                  </p:stCondLst>
+                                  <p:childTnLst>
+                                    <p:set>
+                                      <p:cBhvr>
+                                        <p:cTn id="25" dur="1" fill="hold">
+                                          <p:stCondLst>
+                                            <p:cond delay="0"/>
+                                          </p:stCondLst>
+                                        </p:cTn>
+                                        <p:tgtEl>
+                                          <p:spTgt spid="279">
+                                            <p:txEl>
+                                              <p:pRg st="6" end="6"/>
+                                            </p:txEl>
+                                          </p:spTgt>
+                                        </p:tgtEl>
+                                        <p:attrNameLst>
+                                          <p:attrName>style.visibility</p:attrName>
+                                        </p:attrNameLst>
+                                      </p:cBhvr>
+                                      <p:to>
+                                        <p:strVal val="visible"/>
+                                      </p:to>
+                                    </p:set>
+                                    <p:animEffect transition="in" filter="fade">
+                                      <p:cBhvr>
+                                        <p:cTn id="26" dur="1000"/>
+                                        <p:tgtEl>
+                                          <p:spTgt spid="279">
+                                            <p:txEl>
+                                              <p:pRg st="6" end="6"/>
+                                            </p:txEl>
+                                          </p:spTgt>
+                                        </p:tgtEl>
+                                      </p:cBhvr>
+                                    </p:animEffect>
+                                    <p:anim calcmode="lin" valueType="num">
+                                      <p:cBhvr>
+                                        <p:cTn id="27" dur="1000" fill="hold"/>
+                                        <p:tgtEl>
+                                          <p:spTgt spid="279">
+                                            <p:txEl>
+                                              <p:pRg st="6" end="6"/>
+                                            </p:txEl>
+                                          </p:spTgt>
+                                        </p:tgtEl>
+                                        <p:attrNameLst>
+                                          <p:attrName>ppt_x</p:attrName>
+                                        </p:attrNameLst>
+                                      </p:cBhvr>
+                                      <p:tavLst>
+                                        <p:tav tm="0">
+                                          <p:val>
+                                            <p:strVal val="#ppt_x"/>
+                                          </p:val>
+                                        </p:tav>
+                                        <p:tav tm="100000">
+                                          <p:val>
+                                            <p:strVal val="#ppt_x"/>
+                                          </p:val>
+                                        </p:tav>
+                                      </p:tavLst>
+                                    </p:anim>
+                                    <p:anim calcmode="lin" valueType="num">
+                                      <p:cBhvr>
+                                        <p:cTn id="28" dur="1000" fill="hold"/>
+                                        <p:tgtEl>
+                                          <p:spTgt spid="279">
+                                            <p:txEl>
+                                              <p:pRg st="6" end="6"/>
+                                            </p:txEl>
+                                          </p:spTgt>
+                                        </p:tgtEl>
+                                        <p:attrNameLst>
+                                          <p:attrName>ppt_y</p:attrName>
+                                        </p:attrNameLst>
+                                      </p:cBhvr>
+                                      <p:tavLst>
+                                        <p:tav tm="0">
+                                          <p:val>
+                                            <p:strVal val="#ppt_y+.1"/>
+                                          </p:val>
+                                        </p:tav>
+                                        <p:tav tm="100000">
+                                          <p:val>
+                                            <p:strVal val="#ppt_y"/>
+                                          </p:val>
+                                        </p:tav>
+                                      </p:tavLst>
+                                    </p:anim>
+                                  </p:childTnLst>
+                                </p:cTn>
+                              </p:par>
+                              <p:par>
+                                <p:cTn id="29" presetID="42" presetClass="entr" presetSubtype="0" fill="hold" nodeType="withEffect">
+                                  <p:stCondLst>
+                                    <p:cond delay="0"/>
+                                  </p:stCondLst>
+                                  <p:childTnLst>
+                                    <p:set>
+                                      <p:cBhvr>
+                                        <p:cTn id="30" dur="1" fill="hold">
+                                          <p:stCondLst>
+                                            <p:cond delay="0"/>
+                                          </p:stCondLst>
+                                        </p:cTn>
+                                        <p:tgtEl>
+                                          <p:spTgt spid="279">
+                                            <p:txEl>
+                                              <p:pRg st="7" end="7"/>
+                                            </p:txEl>
+                                          </p:spTgt>
+                                        </p:tgtEl>
+                                        <p:attrNameLst>
+                                          <p:attrName>style.visibility</p:attrName>
+                                        </p:attrNameLst>
+                                      </p:cBhvr>
+                                      <p:to>
+                                        <p:strVal val="visible"/>
+                                      </p:to>
+                                    </p:set>
+                                    <p:animEffect transition="in" filter="fade">
+                                      <p:cBhvr>
+                                        <p:cTn id="31" dur="1000"/>
+                                        <p:tgtEl>
+                                          <p:spTgt spid="279">
+                                            <p:txEl>
+                                              <p:pRg st="7" end="7"/>
+                                            </p:txEl>
+                                          </p:spTgt>
+                                        </p:tgtEl>
+                                      </p:cBhvr>
+                                    </p:animEffect>
+                                    <p:anim calcmode="lin" valueType="num">
+                                      <p:cBhvr>
+                                        <p:cTn id="32" dur="1000" fill="hold"/>
+                                        <p:tgtEl>
+                                          <p:spTgt spid="279">
+                                            <p:txEl>
+                                              <p:pRg st="7" end="7"/>
+                                            </p:txEl>
+                                          </p:spTgt>
+                                        </p:tgtEl>
+                                        <p:attrNameLst>
+                                          <p:attrName>ppt_x</p:attrName>
+                                        </p:attrNameLst>
+                                      </p:cBhvr>
+                                      <p:tavLst>
+                                        <p:tav tm="0">
+                                          <p:val>
+                                            <p:strVal val="#ppt_x"/>
+                                          </p:val>
+                                        </p:tav>
+                                        <p:tav tm="100000">
+                                          <p:val>
+                                            <p:strVal val="#ppt_x"/>
+                                          </p:val>
+                                        </p:tav>
+                                      </p:tavLst>
+                                    </p:anim>
+                                    <p:anim calcmode="lin" valueType="num">
+                                      <p:cBhvr>
+                                        <p:cTn id="33" dur="1000" fill="hold"/>
+                                        <p:tgtEl>
+                                          <p:spTgt spid="279">
+                                            <p:txEl>
+                                              <p:pRg st="7" end="7"/>
+                                            </p:txEl>
+                                          </p:spTgt>
+                                        </p:tgtEl>
+                                        <p:attrNameLst>
+                                          <p:attrName>ppt_y</p:attrName>
+                                        </p:attrNameLst>
+                                      </p:cBhvr>
+                                      <p:tavLst>
+                                        <p:tav tm="0">
+                                          <p:val>
+                                            <p:strVal val="#ppt_y+.1"/>
+                                          </p:val>
+                                        </p:tav>
+                                        <p:tav tm="100000">
+                                          <p:val>
+                                            <p:strVal val="#ppt_y"/>
+                                          </p:val>
+                                        </p:tav>
+                                      </p:tavLst>
+                                    </p:anim>
+                                  </p:childTnLst>
+                                </p:cTn>
+                              </p:par>
+                            </p:childTnLst>
+                          </p:cTn>
+                        </p:par>
+                      </p:childTnLst>
+                    </p:cTn>
+                  </p:par>
+                </p:childTnLst>
+              </p:cTn>
+              <p:prevCondLst>
+                <p:cond evt="onPrev" delay="0">
+                  <p:tgtEl>
+                    <p:sldTgt/>
+                  </p:tgtEl>
+                </p:cond>
+              </p:prevCondLst>
+              <p:nextCondLst>
+                <p:cond evt="onNext" delay="0">
+                  <p:tgtEl>
+                    <p:sldTgt/>
+                  </p:tgtEl>
+                </p:cond>
+              </p:nextCondLst>
+            </p:seq>
+          </p:childTnLst>
+        </p:cTn>
+      </p:par>
+    </p:tnLst>
+  </p:timing>
 </p:sld>
 </file>
 
@@ -20678,16 +24067,7 @@
                 <a:cs typeface="Courier New"/>
                 <a:sym typeface="Courier New"/>
               </a:rPr>
-              <a:t>module1</a:t>
-            </a:r>
-            <a:r>
-              <a:rPr lang="en-US" sz="4000" b="1">
-                <a:latin typeface="Courier New"/>
-                <a:ea typeface="Courier New"/>
-                <a:cs typeface="Courier New"/>
-                <a:sym typeface="Courier New"/>
-              </a:rPr>
-              <a:t>, </a:t>
+              <a:t>module1, </a:t>
             </a:r>
             <a:r>
               <a:rPr lang="en-US" sz="4000" b="1" smtClean="0">
@@ -21000,6 +24380,13 @@
   <p:clrMapOvr>
     <a:masterClrMapping/>
   </p:clrMapOvr>
+  <p:timing>
+    <p:tnLst>
+      <p:par>
+        <p:cTn id="1" dur="indefinite" restart="never" nodeType="tmRoot"/>
+      </p:par>
+    </p:tnLst>
+  </p:timing>
 </p:sld>
 </file>
 
@@ -21398,19 +24785,7 @@
                 <a:cs typeface="Courier New"/>
                 <a:sym typeface="Courier New"/>
               </a:rPr>
-              <a:t>0</a:t>
-            </a:r>
-            <a:r>
-              <a:rPr lang="en-US" sz="4000" b="1">
-                <a:solidFill>
-                  <a:srgbClr val="FF00FF"/>
-                </a:solidFill>
-                <a:latin typeface="Courier New"/>
-                <a:ea typeface="Courier New"/>
-                <a:cs typeface="Courier New"/>
-                <a:sym typeface="Courier New"/>
-              </a:rPr>
-              <a:t>, </a:t>
+              <a:t>0, </a:t>
             </a:r>
             <a:r>
               <a:rPr lang="en-US" sz="4000" b="1" smtClean="0">
@@ -21512,6 +24887,13 @@
   <p:clrMapOvr>
     <a:masterClrMapping/>
   </p:clrMapOvr>
+  <p:timing>
+    <p:tnLst>
+      <p:par>
+        <p:cTn id="1" dur="indefinite" restart="never" nodeType="tmRoot"/>
+      </p:par>
+    </p:tnLst>
+  </p:timing>
 </p:sld>
 </file>
 

</xml_diff>